<commit_message>
finish eric's ppt part
</commit_message>
<xml_diff>
--- a/To Do List.pptx
+++ b/To Do List.pptx
@@ -10,21 +10,24 @@
   <p:sldIdLst>
     <p:sldId id="256" r:id="rId3"/>
     <p:sldId id="257" r:id="rId5"/>
-    <p:sldId id="262" r:id="rId6"/>
-    <p:sldId id="295" r:id="rId7"/>
-    <p:sldId id="259" r:id="rId8"/>
-    <p:sldId id="268" r:id="rId9"/>
-    <p:sldId id="258" r:id="rId10"/>
-    <p:sldId id="296" r:id="rId11"/>
-    <p:sldId id="272" r:id="rId12"/>
-    <p:sldId id="292" r:id="rId13"/>
+    <p:sldId id="298" r:id="rId6"/>
+    <p:sldId id="299" r:id="rId7"/>
+    <p:sldId id="262" r:id="rId8"/>
+    <p:sldId id="297" r:id="rId9"/>
+    <p:sldId id="295" r:id="rId10"/>
+    <p:sldId id="259" r:id="rId11"/>
+    <p:sldId id="268" r:id="rId12"/>
+    <p:sldId id="258" r:id="rId13"/>
+    <p:sldId id="296" r:id="rId14"/>
+    <p:sldId id="272" r:id="rId15"/>
+    <p:sldId id="292" r:id="rId16"/>
   </p:sldIdLst>
   <p:sldSz cx="9144000" cy="5143500"/>
   <p:notesSz cx="6858000" cy="9144000"/>
   <p:embeddedFontLst>
     <p:embeddedFont>
       <p:font typeface="Nunito"/>
-      <p:regular r:id="rId17"/>
+      <p:regular r:id="rId21"/>
     </p:embeddedFont>
   </p:embeddedFontLst>
   <p:defaultTextStyle>
@@ -273,6 +276,21 @@
     </p:ext>
   </p:extLst>
 </p:presentation>
+</file>
+
+<file path=ppt/commentAuthors.xml><?xml version="1.0" encoding="utf-8"?>
+<p:cmAuthorLst xmlns:a="http://schemas.openxmlformats.org/drawingml/2006/main" xmlns:r="http://schemas.openxmlformats.org/officeDocument/2006/relationships" xmlns:p="http://schemas.openxmlformats.org/presentationml/2006/main">
+  <p:cmAuthor id="1" name="yuchencao" initials="y" lastIdx="1" clrIdx="0"/>
+</p:cmAuthorLst>
+</file>
+
+<file path=ppt/comments/comment1.xml><?xml version="1.0" encoding="utf-8"?>
+<p:cmLst xmlns:a="http://schemas.openxmlformats.org/drawingml/2006/main" xmlns:r="http://schemas.openxmlformats.org/officeDocument/2006/relationships" xmlns:p="http://schemas.openxmlformats.org/presentationml/2006/main">
+  <p:cm authorId="1" dt="2024-06-20T11:32:15.611" idx="1">
+    <p:pos x="5178" y="665"/>
+    <p:text/>
+  </p:cm>
+</p:cmLst>
 </file>
 
 <file path=ppt/notesMasters/notesMaster1.xml><?xml version="1.0" encoding="utf-8"?>
@@ -913,6 +931,105 @@
   <p:cSld>
     <p:spTree>
       <p:nvGrpSpPr>
+        <p:cNvPr id="141" name="Shape 141"/>
+        <p:cNvGrpSpPr/>
+        <p:nvPr/>
+      </p:nvGrpSpPr>
+      <p:grpSpPr>
+        <a:xfrm>
+          <a:off x="0" y="0"/>
+          <a:ext cx="0" cy="0"/>
+          <a:chOff x="0" y="0"/>
+          <a:chExt cx="0" cy="0"/>
+        </a:xfrm>
+      </p:grpSpPr>
+      <p:sp>
+        <p:nvSpPr>
+          <p:cNvPr id="142" name="Google Shape;142;g2e25b5dcd41_0_460:notes"/>
+          <p:cNvSpPr/>
+          <p:nvPr>
+            <p:ph type="sldImg" idx="2"/>
+          </p:nvPr>
+        </p:nvSpPr>
+        <p:spPr>
+          <a:xfrm>
+            <a:off x="381300" y="685800"/>
+            <a:ext cx="6096000" cy="3429000"/>
+          </a:xfrm>
+          <a:custGeom>
+            <a:avLst/>
+            <a:gdLst/>
+            <a:ahLst/>
+            <a:cxnLst/>
+            <a:rect l="l" t="t" r="r" b="b"/>
+            <a:pathLst>
+              <a:path w="120000" h="120000" extrusionOk="0">
+                <a:moveTo>
+                  <a:pt x="0" y="0"/>
+                </a:moveTo>
+                <a:lnTo>
+                  <a:pt x="120000" y="0"/>
+                </a:lnTo>
+                <a:lnTo>
+                  <a:pt x="120000" y="120000"/>
+                </a:lnTo>
+                <a:lnTo>
+                  <a:pt x="0" y="120000"/>
+                </a:lnTo>
+                <a:close/>
+              </a:path>
+            </a:pathLst>
+          </a:custGeom>
+        </p:spPr>
+      </p:sp>
+      <p:sp>
+        <p:nvSpPr>
+          <p:cNvPr id="143" name="Google Shape;143;g2e25b5dcd41_0_460:notes"/>
+          <p:cNvSpPr txBox="1"/>
+          <p:nvPr>
+            <p:ph type="body" idx="1"/>
+          </p:nvPr>
+        </p:nvSpPr>
+        <p:spPr>
+          <a:xfrm>
+            <a:off x="685800" y="4343400"/>
+            <a:ext cx="5486400" cy="4114800"/>
+          </a:xfrm>
+          <a:prstGeom prst="rect">
+            <a:avLst/>
+          </a:prstGeom>
+        </p:spPr>
+        <p:txBody>
+          <a:bodyPr spcFirstLastPara="1" wrap="square" lIns="91425" tIns="91425" rIns="91425" bIns="91425" anchor="t" anchorCtr="0">
+            <a:noAutofit/>
+          </a:bodyPr>
+          <a:lstStyle/>
+          <a:p>
+            <a:pPr marL="0" lvl="0" indent="0" algn="l" rtl="0">
+              <a:spcBef>
+                <a:spcPts val="0"/>
+              </a:spcBef>
+              <a:spcAft>
+                <a:spcPts val="0"/>
+              </a:spcAft>
+              <a:buNone/>
+            </a:pPr>
+          </a:p>
+        </p:txBody>
+      </p:sp>
+    </p:spTree>
+  </p:cSld>
+  <p:clrMapOvr>
+    <a:masterClrMapping/>
+  </p:clrMapOvr>
+</p:notes>
+</file>
+
+<file path=ppt/notesSlides/notesSlide4.xml><?xml version="1.0" encoding="utf-8"?>
+<p:notes xmlns:a="http://schemas.openxmlformats.org/drawingml/2006/main" xmlns:r="http://schemas.openxmlformats.org/officeDocument/2006/relationships" xmlns:p="http://schemas.openxmlformats.org/presentationml/2006/main" showMasterPhAnim="0" showMasterSp="0">
+  <p:cSld>
+    <p:spTree>
+      <p:nvGrpSpPr>
         <p:cNvPr id="135" name="Shape 135"/>
         <p:cNvGrpSpPr/>
         <p:nvPr/>
@@ -967,105 +1084,6 @@
       <p:sp>
         <p:nvSpPr>
           <p:cNvPr id="137" name="Google Shape;137;g2e25b5dcd41_0_455:notes"/>
-          <p:cNvSpPr txBox="1"/>
-          <p:nvPr>
-            <p:ph type="body" idx="1"/>
-          </p:nvPr>
-        </p:nvSpPr>
-        <p:spPr>
-          <a:xfrm>
-            <a:off x="685800" y="4343400"/>
-            <a:ext cx="5486400" cy="4114800"/>
-          </a:xfrm>
-          <a:prstGeom prst="rect">
-            <a:avLst/>
-          </a:prstGeom>
-        </p:spPr>
-        <p:txBody>
-          <a:bodyPr spcFirstLastPara="1" wrap="square" lIns="91425" tIns="91425" rIns="91425" bIns="91425" anchor="t" anchorCtr="0">
-            <a:noAutofit/>
-          </a:bodyPr>
-          <a:lstStyle/>
-          <a:p>
-            <a:pPr marL="0" lvl="0" indent="0" algn="l" rtl="0">
-              <a:spcBef>
-                <a:spcPts val="0"/>
-              </a:spcBef>
-              <a:spcAft>
-                <a:spcPts val="0"/>
-              </a:spcAft>
-              <a:buNone/>
-            </a:pPr>
-          </a:p>
-        </p:txBody>
-      </p:sp>
-    </p:spTree>
-  </p:cSld>
-  <p:clrMapOvr>
-    <a:masterClrMapping/>
-  </p:clrMapOvr>
-</p:notes>
-</file>
-
-<file path=ppt/notesSlides/notesSlide4.xml><?xml version="1.0" encoding="utf-8"?>
-<p:notes xmlns:a="http://schemas.openxmlformats.org/drawingml/2006/main" xmlns:r="http://schemas.openxmlformats.org/officeDocument/2006/relationships" xmlns:p="http://schemas.openxmlformats.org/presentationml/2006/main" showMasterPhAnim="0" showMasterSp="0">
-  <p:cSld>
-    <p:spTree>
-      <p:nvGrpSpPr>
-        <p:cNvPr id="141" name="Shape 141"/>
-        <p:cNvGrpSpPr/>
-        <p:nvPr/>
-      </p:nvGrpSpPr>
-      <p:grpSpPr>
-        <a:xfrm>
-          <a:off x="0" y="0"/>
-          <a:ext cx="0" cy="0"/>
-          <a:chOff x="0" y="0"/>
-          <a:chExt cx="0" cy="0"/>
-        </a:xfrm>
-      </p:grpSpPr>
-      <p:sp>
-        <p:nvSpPr>
-          <p:cNvPr id="142" name="Google Shape;142;g2e25b5dcd41_0_460:notes"/>
-          <p:cNvSpPr/>
-          <p:nvPr>
-            <p:ph type="sldImg" idx="2"/>
-          </p:nvPr>
-        </p:nvSpPr>
-        <p:spPr>
-          <a:xfrm>
-            <a:off x="381300" y="685800"/>
-            <a:ext cx="6096000" cy="3429000"/>
-          </a:xfrm>
-          <a:custGeom>
-            <a:avLst/>
-            <a:gdLst/>
-            <a:ahLst/>
-            <a:cxnLst/>
-            <a:rect l="l" t="t" r="r" b="b"/>
-            <a:pathLst>
-              <a:path w="120000" h="120000" extrusionOk="0">
-                <a:moveTo>
-                  <a:pt x="0" y="0"/>
-                </a:moveTo>
-                <a:lnTo>
-                  <a:pt x="120000" y="0"/>
-                </a:lnTo>
-                <a:lnTo>
-                  <a:pt x="120000" y="120000"/>
-                </a:lnTo>
-                <a:lnTo>
-                  <a:pt x="0" y="120000"/>
-                </a:lnTo>
-                <a:close/>
-              </a:path>
-            </a:pathLst>
-          </a:custGeom>
-        </p:spPr>
-      </p:sp>
-      <p:sp>
-        <p:nvSpPr>
-          <p:cNvPr id="143" name="Google Shape;143;g2e25b5dcd41_0_460:notes"/>
           <p:cNvSpPr txBox="1"/>
           <p:nvPr>
             <p:ph type="body" idx="1"/>
@@ -1210,6 +1228,105 @@
   <p:cSld>
     <p:spTree>
       <p:nvGrpSpPr>
+        <p:cNvPr id="141" name="Shape 141"/>
+        <p:cNvGrpSpPr/>
+        <p:nvPr/>
+      </p:nvGrpSpPr>
+      <p:grpSpPr>
+        <a:xfrm>
+          <a:off x="0" y="0"/>
+          <a:ext cx="0" cy="0"/>
+          <a:chOff x="0" y="0"/>
+          <a:chExt cx="0" cy="0"/>
+        </a:xfrm>
+      </p:grpSpPr>
+      <p:sp>
+        <p:nvSpPr>
+          <p:cNvPr id="142" name="Google Shape;142;g2e25b5dcd41_0_460:notes"/>
+          <p:cNvSpPr/>
+          <p:nvPr>
+            <p:ph type="sldImg" idx="2"/>
+          </p:nvPr>
+        </p:nvSpPr>
+        <p:spPr>
+          <a:xfrm>
+            <a:off x="381300" y="685800"/>
+            <a:ext cx="6096000" cy="3429000"/>
+          </a:xfrm>
+          <a:custGeom>
+            <a:avLst/>
+            <a:gdLst/>
+            <a:ahLst/>
+            <a:cxnLst/>
+            <a:rect l="l" t="t" r="r" b="b"/>
+            <a:pathLst>
+              <a:path w="120000" h="120000" extrusionOk="0">
+                <a:moveTo>
+                  <a:pt x="0" y="0"/>
+                </a:moveTo>
+                <a:lnTo>
+                  <a:pt x="120000" y="0"/>
+                </a:lnTo>
+                <a:lnTo>
+                  <a:pt x="120000" y="120000"/>
+                </a:lnTo>
+                <a:lnTo>
+                  <a:pt x="0" y="120000"/>
+                </a:lnTo>
+                <a:close/>
+              </a:path>
+            </a:pathLst>
+          </a:custGeom>
+        </p:spPr>
+      </p:sp>
+      <p:sp>
+        <p:nvSpPr>
+          <p:cNvPr id="143" name="Google Shape;143;g2e25b5dcd41_0_460:notes"/>
+          <p:cNvSpPr txBox="1"/>
+          <p:nvPr>
+            <p:ph type="body" idx="1"/>
+          </p:nvPr>
+        </p:nvSpPr>
+        <p:spPr>
+          <a:xfrm>
+            <a:off x="685800" y="4343400"/>
+            <a:ext cx="5486400" cy="4114800"/>
+          </a:xfrm>
+          <a:prstGeom prst="rect">
+            <a:avLst/>
+          </a:prstGeom>
+        </p:spPr>
+        <p:txBody>
+          <a:bodyPr spcFirstLastPara="1" wrap="square" lIns="91425" tIns="91425" rIns="91425" bIns="91425" anchor="t" anchorCtr="0">
+            <a:noAutofit/>
+          </a:bodyPr>
+          <a:lstStyle/>
+          <a:p>
+            <a:pPr marL="0" lvl="0" indent="0" algn="l" rtl="0">
+              <a:spcBef>
+                <a:spcPts val="0"/>
+              </a:spcBef>
+              <a:spcAft>
+                <a:spcPts val="0"/>
+              </a:spcAft>
+              <a:buNone/>
+            </a:pPr>
+          </a:p>
+        </p:txBody>
+      </p:sp>
+    </p:spTree>
+  </p:cSld>
+  <p:clrMapOvr>
+    <a:masterClrMapping/>
+  </p:clrMapOvr>
+</p:notes>
+</file>
+
+<file path=ppt/notesSlides/notesSlide7.xml><?xml version="1.0" encoding="utf-8"?>
+<p:notes xmlns:a="http://schemas.openxmlformats.org/drawingml/2006/main" xmlns:r="http://schemas.openxmlformats.org/officeDocument/2006/relationships" xmlns:p="http://schemas.openxmlformats.org/presentationml/2006/main" showMasterPhAnim="0" showMasterSp="0">
+  <p:cSld>
+    <p:spTree>
+      <p:nvGrpSpPr>
         <p:cNvPr id="135" name="Shape 135"/>
         <p:cNvGrpSpPr/>
         <p:nvPr/>
@@ -1304,7 +1421,106 @@
 </p:notes>
 </file>
 
-<file path=ppt/notesSlides/notesSlide7.xml><?xml version="1.0" encoding="utf-8"?>
+<file path=ppt/notesSlides/notesSlide8.xml><?xml version="1.0" encoding="utf-8"?>
+<p:notes xmlns:a="http://schemas.openxmlformats.org/drawingml/2006/main" xmlns:r="http://schemas.openxmlformats.org/officeDocument/2006/relationships" xmlns:p="http://schemas.openxmlformats.org/presentationml/2006/main" showMasterPhAnim="0" showMasterSp="0">
+  <p:cSld>
+    <p:spTree>
+      <p:nvGrpSpPr>
+        <p:cNvPr id="135" name="Shape 135"/>
+        <p:cNvGrpSpPr/>
+        <p:nvPr/>
+      </p:nvGrpSpPr>
+      <p:grpSpPr>
+        <a:xfrm>
+          <a:off x="0" y="0"/>
+          <a:ext cx="0" cy="0"/>
+          <a:chOff x="0" y="0"/>
+          <a:chExt cx="0" cy="0"/>
+        </a:xfrm>
+      </p:grpSpPr>
+      <p:sp>
+        <p:nvSpPr>
+          <p:cNvPr id="136" name="Google Shape;136;g2e25b5dcd41_0_455:notes"/>
+          <p:cNvSpPr/>
+          <p:nvPr>
+            <p:ph type="sldImg" idx="2"/>
+          </p:nvPr>
+        </p:nvSpPr>
+        <p:spPr>
+          <a:xfrm>
+            <a:off x="381300" y="685800"/>
+            <a:ext cx="6096000" cy="3429000"/>
+          </a:xfrm>
+          <a:custGeom>
+            <a:avLst/>
+            <a:gdLst/>
+            <a:ahLst/>
+            <a:cxnLst/>
+            <a:rect l="l" t="t" r="r" b="b"/>
+            <a:pathLst>
+              <a:path w="120000" h="120000" extrusionOk="0">
+                <a:moveTo>
+                  <a:pt x="0" y="0"/>
+                </a:moveTo>
+                <a:lnTo>
+                  <a:pt x="120000" y="0"/>
+                </a:lnTo>
+                <a:lnTo>
+                  <a:pt x="120000" y="120000"/>
+                </a:lnTo>
+                <a:lnTo>
+                  <a:pt x="0" y="120000"/>
+                </a:lnTo>
+                <a:close/>
+              </a:path>
+            </a:pathLst>
+          </a:custGeom>
+        </p:spPr>
+      </p:sp>
+      <p:sp>
+        <p:nvSpPr>
+          <p:cNvPr id="137" name="Google Shape;137;g2e25b5dcd41_0_455:notes"/>
+          <p:cNvSpPr txBox="1"/>
+          <p:nvPr>
+            <p:ph type="body" idx="1"/>
+          </p:nvPr>
+        </p:nvSpPr>
+        <p:spPr>
+          <a:xfrm>
+            <a:off x="685800" y="4343400"/>
+            <a:ext cx="5486400" cy="4114800"/>
+          </a:xfrm>
+          <a:prstGeom prst="rect">
+            <a:avLst/>
+          </a:prstGeom>
+        </p:spPr>
+        <p:txBody>
+          <a:bodyPr spcFirstLastPara="1" wrap="square" lIns="91425" tIns="91425" rIns="91425" bIns="91425" anchor="t" anchorCtr="0">
+            <a:noAutofit/>
+          </a:bodyPr>
+          <a:lstStyle/>
+          <a:p>
+            <a:pPr marL="0" lvl="0" indent="0" algn="l" rtl="0">
+              <a:spcBef>
+                <a:spcPts val="0"/>
+              </a:spcBef>
+              <a:spcAft>
+                <a:spcPts val="0"/>
+              </a:spcAft>
+              <a:buNone/>
+            </a:pPr>
+          </a:p>
+        </p:txBody>
+      </p:sp>
+    </p:spTree>
+  </p:cSld>
+  <p:clrMapOvr>
+    <a:masterClrMapping/>
+  </p:clrMapOvr>
+</p:notes>
+</file>
+
+<file path=ppt/notesSlides/notesSlide9.xml><?xml version="1.0" encoding="utf-8"?>
 <p:notes xmlns:a="http://schemas.openxmlformats.org/drawingml/2006/main" xmlns:r="http://schemas.openxmlformats.org/officeDocument/2006/relationships" xmlns:p="http://schemas.openxmlformats.org/presentationml/2006/main" showMasterPhAnim="0" showMasterSp="0">
   <p:cSld>
     <p:spTree>
@@ -9488,6 +9704,444 @@
   <p:cSld>
     <p:spTree>
       <p:nvGrpSpPr>
+        <p:cNvPr id="138" name="Shape 138"/>
+        <p:cNvGrpSpPr/>
+        <p:nvPr/>
+      </p:nvGrpSpPr>
+      <p:grpSpPr>
+        <a:xfrm>
+          <a:off x="0" y="0"/>
+          <a:ext cx="0" cy="0"/>
+          <a:chOff x="0" y="0"/>
+          <a:chExt cx="0" cy="0"/>
+        </a:xfrm>
+      </p:grpSpPr>
+      <p:sp>
+        <p:nvSpPr>
+          <p:cNvPr id="139" name="Google Shape;139;p15"/>
+          <p:cNvSpPr txBox="1"/>
+          <p:nvPr>
+            <p:ph type="title"/>
+          </p:nvPr>
+        </p:nvSpPr>
+        <p:spPr>
+          <a:xfrm>
+            <a:off x="819150" y="495300"/>
+            <a:ext cx="7505700" cy="753745"/>
+          </a:xfrm>
+          <a:prstGeom prst="rect">
+            <a:avLst/>
+          </a:prstGeom>
+        </p:spPr>
+        <p:txBody>
+          <a:bodyPr spcFirstLastPara="1" wrap="square" lIns="91425" tIns="91425" rIns="91425" bIns="91425" anchor="t" anchorCtr="0">
+            <a:normAutofit/>
+          </a:bodyPr>
+          <a:lstStyle/>
+          <a:p>
+            <a:pPr marL="0" lvl="0" indent="0" algn="l" rtl="0">
+              <a:spcBef>
+                <a:spcPts val="0"/>
+              </a:spcBef>
+              <a:spcAft>
+                <a:spcPts val="0"/>
+              </a:spcAft>
+              <a:buNone/>
+            </a:pPr>
+            <a:r>
+              <a:rPr lang="en-US"/>
+              <a:t>Back-End</a:t>
+            </a:r>
+            <a:endParaRPr lang="en-US"/>
+          </a:p>
+        </p:txBody>
+      </p:sp>
+      <p:sp>
+        <p:nvSpPr>
+          <p:cNvPr id="140" name="Google Shape;140;p15"/>
+          <p:cNvSpPr txBox="1"/>
+          <p:nvPr>
+            <p:ph type="body" idx="1"/>
+          </p:nvPr>
+        </p:nvSpPr>
+        <p:spPr>
+          <a:xfrm>
+            <a:off x="819150" y="1249045"/>
+            <a:ext cx="7505700" cy="2941320"/>
+          </a:xfrm>
+          <a:prstGeom prst="rect">
+            <a:avLst/>
+          </a:prstGeom>
+        </p:spPr>
+        <p:txBody>
+          <a:bodyPr spcFirstLastPara="1" wrap="square" lIns="91425" tIns="91425" rIns="91425" bIns="91425" anchor="t" anchorCtr="0">
+            <a:normAutofit lnSpcReduction="10000"/>
+          </a:bodyPr>
+          <a:lstStyle/>
+          <a:p>
+            <a:pPr marL="0" lvl="0" indent="0" algn="l" rtl="0">
+              <a:spcBef>
+                <a:spcPts val="0"/>
+              </a:spcBef>
+              <a:spcAft>
+                <a:spcPts val="1200"/>
+              </a:spcAft>
+              <a:buNone/>
+            </a:pPr>
+            <a:r>
+              <a:rPr lang="en-US" sz="1800">
+                <a:latin typeface="Times New Roman Regular" panose="02020503050405090304" charset="0"/>
+                <a:cs typeface="Times New Roman Regular" panose="02020503050405090304" charset="0"/>
+              </a:rPr>
+              <a:t>To do</a:t>
+            </a:r>
+            <a:endParaRPr lang="en-US" sz="1800">
+              <a:latin typeface="Times New Roman Regular" panose="02020503050405090304" charset="0"/>
+              <a:cs typeface="Times New Roman Regular" panose="02020503050405090304" charset="0"/>
+            </a:endParaRPr>
+          </a:p>
+        </p:txBody>
+      </p:sp>
+      <p:sp>
+        <p:nvSpPr>
+          <p:cNvPr id="2" name="Slide Number Placeholder 1"/>
+          <p:cNvSpPr>
+            <a:spLocks noGrp="1"/>
+          </p:cNvSpPr>
+          <p:nvPr>
+            <p:ph type="sldNum" idx="12"/>
+          </p:nvPr>
+        </p:nvSpPr>
+        <p:spPr/>
+        <p:txBody>
+          <a:bodyPr/>
+          <a:p>
+            <a:pPr marL="0" lvl="0" indent="0" algn="r" rtl="0">
+              <a:spcBef>
+                <a:spcPts val="0"/>
+              </a:spcBef>
+              <a:spcAft>
+                <a:spcPts val="0"/>
+              </a:spcAft>
+              <a:buNone/>
+            </a:pPr>
+            <a:fld id="{00000000-1234-1234-1234-123412341234}" type="slidenum">
+              <a:rPr lang="en-GB"/>
+            </a:fld>
+            <a:endParaRPr lang="en-GB"/>
+          </a:p>
+        </p:txBody>
+      </p:sp>
+    </p:spTree>
+  </p:cSld>
+  <p:clrMapOvr>
+    <a:masterClrMapping/>
+  </p:clrMapOvr>
+  <mc:AlternateContent xmlns:mc="http://schemas.openxmlformats.org/markup-compatibility/2006">
+    <mc:Choice xmlns:p14="http://schemas.microsoft.com/office/powerpoint/2010/main" Requires="p14">
+      <p:transition spd="slow" p14:dur="1000">
+        <p:push dir="u"/>
+      </p:transition>
+    </mc:Choice>
+    <mc:Fallback>
+      <p:transition spd="slow">
+        <p:push dir="u"/>
+      </p:transition>
+    </mc:Fallback>
+  </mc:AlternateContent>
+</p:sld>
+</file>
+
+<file path=ppt/slides/slide11.xml><?xml version="1.0" encoding="utf-8"?>
+<p:sld xmlns:a="http://schemas.openxmlformats.org/drawingml/2006/main" xmlns:r="http://schemas.openxmlformats.org/officeDocument/2006/relationships" xmlns:p="http://schemas.openxmlformats.org/presentationml/2006/main">
+  <p:cSld>
+    <p:spTree>
+      <p:nvGrpSpPr>
+        <p:cNvPr id="138" name="Shape 138"/>
+        <p:cNvGrpSpPr/>
+        <p:nvPr/>
+      </p:nvGrpSpPr>
+      <p:grpSpPr>
+        <a:xfrm>
+          <a:off x="0" y="0"/>
+          <a:ext cx="0" cy="0"/>
+          <a:chOff x="0" y="0"/>
+          <a:chExt cx="0" cy="0"/>
+        </a:xfrm>
+      </p:grpSpPr>
+      <p:sp>
+        <p:nvSpPr>
+          <p:cNvPr id="139" name="Google Shape;139;p15"/>
+          <p:cNvSpPr txBox="1"/>
+          <p:nvPr>
+            <p:ph type="title"/>
+          </p:nvPr>
+        </p:nvSpPr>
+        <p:spPr>
+          <a:xfrm>
+            <a:off x="819150" y="495300"/>
+            <a:ext cx="7505700" cy="753745"/>
+          </a:xfrm>
+          <a:prstGeom prst="rect">
+            <a:avLst/>
+          </a:prstGeom>
+        </p:spPr>
+        <p:txBody>
+          <a:bodyPr spcFirstLastPara="1" wrap="square" lIns="91425" tIns="91425" rIns="91425" bIns="91425" anchor="t" anchorCtr="0">
+            <a:normAutofit/>
+          </a:bodyPr>
+          <a:lstStyle/>
+          <a:p>
+            <a:pPr marL="0" lvl="0" indent="0" algn="l" rtl="0">
+              <a:spcBef>
+                <a:spcPts val="0"/>
+              </a:spcBef>
+              <a:spcAft>
+                <a:spcPts val="0"/>
+              </a:spcAft>
+              <a:buNone/>
+            </a:pPr>
+            <a:r>
+              <a:rPr lang="en-US"/>
+              <a:t>Back-End</a:t>
+            </a:r>
+            <a:endParaRPr lang="en-US"/>
+          </a:p>
+        </p:txBody>
+      </p:sp>
+      <p:sp>
+        <p:nvSpPr>
+          <p:cNvPr id="140" name="Google Shape;140;p15"/>
+          <p:cNvSpPr txBox="1"/>
+          <p:nvPr>
+            <p:ph type="body" idx="1"/>
+          </p:nvPr>
+        </p:nvSpPr>
+        <p:spPr>
+          <a:xfrm>
+            <a:off x="819150" y="1249045"/>
+            <a:ext cx="7505700" cy="2941320"/>
+          </a:xfrm>
+          <a:prstGeom prst="rect">
+            <a:avLst/>
+          </a:prstGeom>
+        </p:spPr>
+        <p:txBody>
+          <a:bodyPr spcFirstLastPara="1" wrap="square" lIns="91425" tIns="91425" rIns="91425" bIns="91425" anchor="t" anchorCtr="0">
+            <a:normAutofit lnSpcReduction="10000"/>
+          </a:bodyPr>
+          <a:lstStyle/>
+          <a:p>
+            <a:pPr marL="0" lvl="0" indent="0" algn="l" rtl="0">
+              <a:spcBef>
+                <a:spcPts val="0"/>
+              </a:spcBef>
+              <a:spcAft>
+                <a:spcPts val="1200"/>
+              </a:spcAft>
+              <a:buNone/>
+            </a:pPr>
+            <a:r>
+              <a:rPr lang="en-US" sz="1800">
+                <a:latin typeface="Times New Roman Regular" panose="02020503050405090304" charset="0"/>
+                <a:cs typeface="Times New Roman Regular" panose="02020503050405090304" charset="0"/>
+              </a:rPr>
+              <a:t>To do</a:t>
+            </a:r>
+            <a:endParaRPr lang="en-US" sz="1800">
+              <a:latin typeface="Times New Roman Regular" panose="02020503050405090304" charset="0"/>
+              <a:cs typeface="Times New Roman Regular" panose="02020503050405090304" charset="0"/>
+            </a:endParaRPr>
+          </a:p>
+        </p:txBody>
+      </p:sp>
+      <p:sp>
+        <p:nvSpPr>
+          <p:cNvPr id="2" name="Slide Number Placeholder 1"/>
+          <p:cNvSpPr>
+            <a:spLocks noGrp="1"/>
+          </p:cNvSpPr>
+          <p:nvPr>
+            <p:ph type="sldNum" idx="12"/>
+          </p:nvPr>
+        </p:nvSpPr>
+        <p:spPr/>
+        <p:txBody>
+          <a:bodyPr/>
+          <a:p>
+            <a:pPr marL="0" lvl="0" indent="0" algn="r" rtl="0">
+              <a:spcBef>
+                <a:spcPts val="0"/>
+              </a:spcBef>
+              <a:spcAft>
+                <a:spcPts val="0"/>
+              </a:spcAft>
+              <a:buNone/>
+            </a:pPr>
+            <a:fld id="{00000000-1234-1234-1234-123412341234}" type="slidenum">
+              <a:rPr lang="en-GB"/>
+            </a:fld>
+            <a:endParaRPr lang="en-GB"/>
+          </a:p>
+        </p:txBody>
+      </p:sp>
+    </p:spTree>
+  </p:cSld>
+  <p:clrMapOvr>
+    <a:masterClrMapping/>
+  </p:clrMapOvr>
+  <mc:AlternateContent xmlns:mc="http://schemas.openxmlformats.org/markup-compatibility/2006">
+    <mc:Choice xmlns:p14="http://schemas.microsoft.com/office/powerpoint/2010/main" Requires="p14">
+      <p:transition spd="slow" p14:dur="1000">
+        <p:push dir="u"/>
+      </p:transition>
+    </mc:Choice>
+    <mc:Fallback>
+      <p:transition spd="slow">
+        <p:push dir="u"/>
+      </p:transition>
+    </mc:Fallback>
+  </mc:AlternateContent>
+</p:sld>
+</file>
+
+<file path=ppt/slides/slide12.xml><?xml version="1.0" encoding="utf-8"?>
+<p:sld xmlns:a="http://schemas.openxmlformats.org/drawingml/2006/main" xmlns:r="http://schemas.openxmlformats.org/officeDocument/2006/relationships" xmlns:p="http://schemas.openxmlformats.org/presentationml/2006/main">
+  <p:cSld>
+    <p:spTree>
+      <p:nvGrpSpPr>
+        <p:cNvPr id="1" name=""/>
+        <p:cNvGrpSpPr/>
+        <p:nvPr/>
+      </p:nvGrpSpPr>
+      <p:grpSpPr/>
+      <p:sp>
+        <p:nvSpPr>
+          <p:cNvPr id="4" name="Slide Number Placeholder 3"/>
+          <p:cNvSpPr>
+            <a:spLocks noGrp="1"/>
+          </p:cNvSpPr>
+          <p:nvPr>
+            <p:ph type="sldNum" idx="12"/>
+          </p:nvPr>
+        </p:nvSpPr>
+        <p:spPr/>
+        <p:txBody>
+          <a:bodyPr/>
+          <a:p>
+            <a:pPr marL="0" lvl="0" indent="0" algn="r" rtl="0">
+              <a:spcBef>
+                <a:spcPts val="0"/>
+              </a:spcBef>
+              <a:spcAft>
+                <a:spcPts val="0"/>
+              </a:spcAft>
+              <a:buNone/>
+            </a:pPr>
+            <a:fld id="{00000000-1234-1234-1234-123412341234}" type="slidenum">
+              <a:rPr lang="en-GB"/>
+            </a:fld>
+            <a:endParaRPr lang="en-GB"/>
+          </a:p>
+        </p:txBody>
+      </p:sp>
+      <p:sp>
+        <p:nvSpPr>
+          <p:cNvPr id="6" name="Rectangles 5"/>
+          <p:cNvSpPr/>
+          <p:nvPr/>
+        </p:nvSpPr>
+        <p:spPr>
+          <a:xfrm>
+            <a:off x="544830" y="1972310"/>
+            <a:ext cx="8054340" cy="1106805"/>
+          </a:xfrm>
+          <a:prstGeom prst="rect">
+            <a:avLst/>
+          </a:prstGeom>
+          <a:noFill/>
+          <a:ln>
+            <a:noFill/>
+          </a:ln>
+          <a:extLst>
+            <a:ext uri="{909E8E84-426E-40DD-AFC4-6F175D3DCCD1}">
+              <a14:hiddenFill xmlns:a14="http://schemas.microsoft.com/office/drawing/2010/main">
+                <a:solidFill>
+                  <a:schemeClr val="bg2"/>
+                </a:solidFill>
+              </a14:hiddenFill>
+            </a:ext>
+          </a:extLst>
+        </p:spPr>
+        <p:txBody>
+          <a:bodyPr wrap="none" rtlCol="0" anchor="t">
+            <a:spAutoFit/>
+            <a:scene3d>
+              <a:camera prst="orthographicFront"/>
+              <a:lightRig rig="threePt" dir="t"/>
+            </a:scene3d>
+          </a:bodyPr>
+          <a:p>
+            <a:pPr algn="ctr"/>
+            <a:r>
+              <a:rPr lang="en-US" altLang="zh-CN" sz="6600" b="1">
+                <a:ln w="22225">
+                  <a:solidFill>
+                    <a:sysClr val="windowText" lastClr="000000"/>
+                  </a:solidFill>
+                  <a:prstDash val="solid"/>
+                </a:ln>
+                <a:solidFill>
+                  <a:schemeClr val="tx2">
+                    <a:lumMod val="90000"/>
+                  </a:schemeClr>
+                </a:solidFill>
+                <a:effectLst/>
+              </a:rPr>
+              <a:t>Result Presentation</a:t>
+            </a:r>
+            <a:endParaRPr lang="en-US" altLang="zh-CN" sz="6600" b="1">
+              <a:ln w="22225">
+                <a:solidFill>
+                  <a:sysClr val="windowText" lastClr="000000"/>
+                </a:solidFill>
+                <a:prstDash val="solid"/>
+              </a:ln>
+              <a:solidFill>
+                <a:schemeClr val="tx2">
+                  <a:lumMod val="90000"/>
+                </a:schemeClr>
+              </a:solidFill>
+              <a:effectLst/>
+            </a:endParaRPr>
+          </a:p>
+        </p:txBody>
+      </p:sp>
+    </p:spTree>
+  </p:cSld>
+  <p:clrMapOvr>
+    <a:masterClrMapping/>
+  </p:clrMapOvr>
+  <mc:AlternateContent xmlns:mc="http://schemas.openxmlformats.org/markup-compatibility/2006">
+    <mc:Choice xmlns:p14="http://schemas.microsoft.com/office/powerpoint/2010/main" Requires="p14">
+      <p:transition spd="slow" p14:dur="1000">
+        <p:push dir="u"/>
+      </p:transition>
+    </mc:Choice>
+    <mc:Fallback>
+      <p:transition spd="slow">
+        <p:push dir="u"/>
+      </p:transition>
+    </mc:Fallback>
+  </mc:AlternateContent>
+</p:sld>
+</file>
+
+<file path=ppt/slides/slide13.xml><?xml version="1.0" encoding="utf-8"?>
+<p:sld xmlns:a="http://schemas.openxmlformats.org/drawingml/2006/main" xmlns:r="http://schemas.openxmlformats.org/officeDocument/2006/relationships" xmlns:p="http://schemas.openxmlformats.org/presentationml/2006/main">
+  <p:cSld>
+    <p:spTree>
+      <p:nvGrpSpPr>
         <p:cNvPr id="127" name="Shape 127"/>
         <p:cNvGrpSpPr/>
         <p:nvPr/>
@@ -9674,9 +10328,75 @@
         </p:spPr>
         <p:txBody>
           <a:bodyPr spcFirstLastPara="1" wrap="square" lIns="91425" tIns="91425" rIns="91425" bIns="91425" anchor="t" anchorCtr="0">
-            <a:normAutofit/>
+            <a:normAutofit fontScale="90000" lnSpcReduction="20000"/>
           </a:bodyPr>
           <a:lstStyle/>
+          <a:p>
+            <a:pPr marL="457200" lvl="0" indent="-355600" algn="l" rtl="0">
+              <a:spcBef>
+                <a:spcPts val="0"/>
+              </a:spcBef>
+              <a:spcAft>
+                <a:spcPts val="0"/>
+              </a:spcAft>
+              <a:buSzPts val="2000"/>
+              <a:buFont typeface="Times New Roman" panose="02020503050405090304"/>
+              <a:buAutoNum type="arabicPeriod"/>
+            </a:pPr>
+            <a:r>
+              <a:rPr lang="en-US" altLang="zh-CN" sz="2000">
+                <a:latin typeface="Times New Roman" panose="02020503050405090304"/>
+                <a:ea typeface="Times New Roman" panose="02020503050405090304"/>
+                <a:cs typeface="Times New Roman" panose="02020503050405090304"/>
+                <a:sym typeface="Times New Roman" panose="02020503050405090304"/>
+              </a:rPr>
+              <a:t>Project Introduction</a:t>
+            </a:r>
+            <a:endParaRPr lang="en-US" altLang="zh-CN" sz="2000">
+              <a:latin typeface="Times New Roman" panose="02020503050405090304"/>
+              <a:ea typeface="Times New Roman" panose="02020503050405090304"/>
+              <a:cs typeface="Times New Roman" panose="02020503050405090304"/>
+              <a:sym typeface="Times New Roman" panose="02020503050405090304"/>
+            </a:endParaRPr>
+          </a:p>
+          <a:p>
+            <a:pPr marL="457200" lvl="0" indent="-355600" algn="l" rtl="0">
+              <a:spcBef>
+                <a:spcPts val="0"/>
+              </a:spcBef>
+              <a:spcAft>
+                <a:spcPts val="0"/>
+              </a:spcAft>
+              <a:buSzPts val="2000"/>
+              <a:buFont typeface="Times New Roman" panose="02020503050405090304"/>
+              <a:buAutoNum type="arabicPeriod"/>
+            </a:pPr>
+            <a:endParaRPr lang="en-US" altLang="zh-CN" sz="2000">
+              <a:latin typeface="Times New Roman" panose="02020503050405090304"/>
+              <a:ea typeface="Times New Roman" panose="02020503050405090304"/>
+              <a:cs typeface="Times New Roman" panose="02020503050405090304"/>
+              <a:sym typeface="Times New Roman" panose="02020503050405090304"/>
+            </a:endParaRPr>
+          </a:p>
+          <a:p>
+            <a:pPr marL="457200" lvl="0" indent="-355600" algn="l" rtl="0">
+              <a:spcBef>
+                <a:spcPts val="0"/>
+              </a:spcBef>
+              <a:spcAft>
+                <a:spcPts val="0"/>
+              </a:spcAft>
+              <a:buSzPts val="2000"/>
+              <a:buFont typeface="Times New Roman" panose="02020503050405090304"/>
+              <a:buAutoNum type="arabicPeriod"/>
+            </a:pPr>
+            <a:endParaRPr lang="en-US" altLang="zh-CN" sz="2000">
+              <a:latin typeface="Times New Roman" panose="02020503050405090304"/>
+              <a:ea typeface="Times New Roman" panose="02020503050405090304"/>
+              <a:cs typeface="Times New Roman" panose="02020503050405090304"/>
+              <a:sym typeface="Times New Roman" panose="02020503050405090304"/>
+            </a:endParaRPr>
+          </a:p>
           <a:p>
             <a:pPr marL="457200" lvl="0" indent="-355600" algn="l" rtl="0">
               <a:spcBef>
@@ -9917,6 +10637,459 @@
 </file>
 
 <file path=ppt/slides/slide3.xml><?xml version="1.0" encoding="utf-8"?>
+<p:sld xmlns:a="http://schemas.openxmlformats.org/drawingml/2006/main" xmlns:r="http://schemas.openxmlformats.org/officeDocument/2006/relationships" xmlns:p="http://schemas.openxmlformats.org/presentationml/2006/main">
+  <p:cSld>
+    <p:spTree>
+      <p:nvGrpSpPr>
+        <p:cNvPr id="1" name=""/>
+        <p:cNvGrpSpPr/>
+        <p:nvPr/>
+      </p:nvGrpSpPr>
+      <p:grpSpPr/>
+      <p:sp>
+        <p:nvSpPr>
+          <p:cNvPr id="4" name="Slide Number Placeholder 3"/>
+          <p:cNvSpPr>
+            <a:spLocks noGrp="1"/>
+          </p:cNvSpPr>
+          <p:nvPr>
+            <p:ph type="sldNum" idx="12"/>
+          </p:nvPr>
+        </p:nvSpPr>
+        <p:spPr/>
+        <p:txBody>
+          <a:bodyPr/>
+          <a:p>
+            <a:pPr marL="0" lvl="0" indent="0" algn="r" rtl="0">
+              <a:spcBef>
+                <a:spcPts val="0"/>
+              </a:spcBef>
+              <a:spcAft>
+                <a:spcPts val="0"/>
+              </a:spcAft>
+              <a:buNone/>
+            </a:pPr>
+            <a:fld id="{00000000-1234-1234-1234-123412341234}" type="slidenum">
+              <a:rPr lang="en-GB"/>
+            </a:fld>
+            <a:endParaRPr lang="en-GB"/>
+          </a:p>
+        </p:txBody>
+      </p:sp>
+      <p:sp>
+        <p:nvSpPr>
+          <p:cNvPr id="6" name="Rectangles 5"/>
+          <p:cNvSpPr/>
+          <p:nvPr/>
+        </p:nvSpPr>
+        <p:spPr>
+          <a:xfrm>
+            <a:off x="499110" y="1972310"/>
+            <a:ext cx="8145780" cy="1106805"/>
+          </a:xfrm>
+          <a:prstGeom prst="rect">
+            <a:avLst/>
+          </a:prstGeom>
+          <a:noFill/>
+          <a:ln>
+            <a:noFill/>
+          </a:ln>
+          <a:extLst>
+            <a:ext uri="{909E8E84-426E-40DD-AFC4-6F175D3DCCD1}">
+              <a14:hiddenFill xmlns:a14="http://schemas.microsoft.com/office/drawing/2010/main">
+                <a:solidFill>
+                  <a:schemeClr val="bg2"/>
+                </a:solidFill>
+              </a14:hiddenFill>
+            </a:ext>
+          </a:extLst>
+        </p:spPr>
+        <p:txBody>
+          <a:bodyPr wrap="none" rtlCol="0" anchor="t">
+            <a:spAutoFit/>
+            <a:scene3d>
+              <a:camera prst="orthographicFront"/>
+              <a:lightRig rig="threePt" dir="t"/>
+            </a:scene3d>
+          </a:bodyPr>
+          <a:p>
+            <a:pPr algn="ctr"/>
+            <a:r>
+              <a:rPr lang="en-US" altLang="zh-CN" sz="6600" b="1">
+                <a:ln w="22225">
+                  <a:solidFill>
+                    <a:sysClr val="windowText" lastClr="000000"/>
+                  </a:solidFill>
+                  <a:prstDash val="solid"/>
+                </a:ln>
+                <a:solidFill>
+                  <a:schemeClr val="tx2">
+                    <a:lumMod val="90000"/>
+                  </a:schemeClr>
+                </a:solidFill>
+                <a:effectLst/>
+              </a:rPr>
+              <a:t>Project Introduction</a:t>
+            </a:r>
+            <a:endParaRPr lang="en-US" altLang="zh-CN" sz="6600" b="1">
+              <a:ln w="22225">
+                <a:solidFill>
+                  <a:sysClr val="windowText" lastClr="000000"/>
+                </a:solidFill>
+                <a:prstDash val="solid"/>
+              </a:ln>
+              <a:solidFill>
+                <a:schemeClr val="tx2">
+                  <a:lumMod val="90000"/>
+                </a:schemeClr>
+              </a:solidFill>
+              <a:effectLst/>
+            </a:endParaRPr>
+          </a:p>
+        </p:txBody>
+      </p:sp>
+    </p:spTree>
+  </p:cSld>
+  <p:clrMapOvr>
+    <a:masterClrMapping/>
+  </p:clrMapOvr>
+  <mc:AlternateContent xmlns:mc="http://schemas.openxmlformats.org/markup-compatibility/2006">
+    <mc:Choice xmlns:p14="http://schemas.microsoft.com/office/powerpoint/2010/main" Requires="p14">
+      <p:transition spd="slow" p14:dur="1000">
+        <p:push dir="u"/>
+      </p:transition>
+    </mc:Choice>
+    <mc:Fallback>
+      <p:transition spd="slow">
+        <p:push dir="u"/>
+      </p:transition>
+    </mc:Fallback>
+  </mc:AlternateContent>
+</p:sld>
+</file>
+
+<file path=ppt/slides/slide4.xml><?xml version="1.0" encoding="utf-8"?>
+<p:sld xmlns:a="http://schemas.openxmlformats.org/drawingml/2006/main" xmlns:r="http://schemas.openxmlformats.org/officeDocument/2006/relationships" xmlns:p="http://schemas.openxmlformats.org/presentationml/2006/main">
+  <p:cSld>
+    <p:spTree>
+      <p:nvGrpSpPr>
+        <p:cNvPr id="144" name="Shape 144"/>
+        <p:cNvGrpSpPr/>
+        <p:nvPr/>
+      </p:nvGrpSpPr>
+      <p:grpSpPr>
+        <a:xfrm>
+          <a:off x="0" y="0"/>
+          <a:ext cx="0" cy="0"/>
+          <a:chOff x="0" y="0"/>
+          <a:chExt cx="0" cy="0"/>
+        </a:xfrm>
+      </p:grpSpPr>
+      <p:sp>
+        <p:nvSpPr>
+          <p:cNvPr id="146" name="Google Shape;146;p16"/>
+          <p:cNvSpPr txBox="1"/>
+          <p:nvPr>
+            <p:ph type="body" idx="1"/>
+          </p:nvPr>
+        </p:nvSpPr>
+        <p:spPr>
+          <a:xfrm>
+            <a:off x="1167130" y="1249045"/>
+            <a:ext cx="7000875" cy="3132455"/>
+          </a:xfrm>
+          <a:prstGeom prst="rect">
+            <a:avLst/>
+          </a:prstGeom>
+        </p:spPr>
+        <p:txBody>
+          <a:bodyPr spcFirstLastPara="1" wrap="square" lIns="91425" tIns="91425" rIns="91425" bIns="91425" anchor="t" anchorCtr="0">
+            <a:normAutofit/>
+          </a:bodyPr>
+          <a:lstStyle/>
+          <a:p>
+            <a:pPr marL="0" lvl="0" indent="0" algn="l" rtl="0">
+              <a:spcBef>
+                <a:spcPts val="0"/>
+              </a:spcBef>
+              <a:spcAft>
+                <a:spcPts val="1200"/>
+              </a:spcAft>
+              <a:buNone/>
+            </a:pPr>
+            <a:r>
+              <a:rPr lang="zh-CN" sz="1800">
+                <a:latin typeface="Times New Roman Regular" panose="02020503050405090304" charset="0"/>
+                <a:cs typeface="Times New Roman Regular" panose="02020503050405090304" charset="0"/>
+              </a:rPr>
+              <a:t>项目</a:t>
+            </a:r>
+            <a:r>
+              <a:rPr lang="zh-CN" sz="1800">
+                <a:latin typeface="Times New Roman Regular" panose="02020503050405090304" charset="0"/>
+                <a:cs typeface="Times New Roman Regular" panose="02020503050405090304" charset="0"/>
+              </a:rPr>
+              <a:t>简介：搭建了一个前后端分离的</a:t>
+            </a:r>
+            <a:r>
+              <a:rPr lang="en-US" altLang="zh-CN" sz="1800">
+                <a:latin typeface="Times New Roman Regular" panose="02020503050405090304" charset="0"/>
+                <a:cs typeface="Times New Roman Regular" panose="02020503050405090304" charset="0"/>
+              </a:rPr>
+              <a:t>Todolist</a:t>
+            </a:r>
+            <a:r>
+              <a:rPr lang="zh-CN" altLang="en-US" sz="1800">
+                <a:latin typeface="Times New Roman Regular" panose="02020503050405090304" charset="0"/>
+                <a:cs typeface="Times New Roman Regular" panose="02020503050405090304" charset="0"/>
+              </a:rPr>
+              <a:t>的网站</a:t>
+            </a:r>
+            <a:endParaRPr lang="zh-CN" sz="1800">
+              <a:latin typeface="Times New Roman Regular" panose="02020503050405090304" charset="0"/>
+              <a:cs typeface="Times New Roman Regular" panose="02020503050405090304" charset="0"/>
+            </a:endParaRPr>
+          </a:p>
+          <a:p>
+            <a:pPr marL="0" lvl="0" indent="0" algn="l" rtl="0">
+              <a:spcBef>
+                <a:spcPts val="0"/>
+              </a:spcBef>
+              <a:spcAft>
+                <a:spcPts val="1200"/>
+              </a:spcAft>
+              <a:buNone/>
+            </a:pPr>
+            <a:endParaRPr lang="zh-CN" sz="1800">
+              <a:latin typeface="Times New Roman Regular" panose="02020503050405090304" charset="0"/>
+              <a:cs typeface="Times New Roman Regular" panose="02020503050405090304" charset="0"/>
+            </a:endParaRPr>
+          </a:p>
+          <a:p>
+            <a:pPr marL="0" lvl="0" indent="0" algn="l" rtl="0">
+              <a:spcBef>
+                <a:spcPts val="0"/>
+              </a:spcBef>
+              <a:spcAft>
+                <a:spcPts val="1200"/>
+              </a:spcAft>
+              <a:buNone/>
+            </a:pPr>
+            <a:r>
+              <a:rPr lang="zh-CN" sz="1800">
+                <a:latin typeface="Times New Roman Regular" panose="02020503050405090304" charset="0"/>
+                <a:cs typeface="Times New Roman Regular" panose="02020503050405090304" charset="0"/>
+              </a:rPr>
+              <a:t>前端：</a:t>
+            </a:r>
+            <a:r>
+              <a:rPr lang="en-US" altLang="zh-CN" sz="1800">
+                <a:latin typeface="Times New Roman Regular" panose="02020503050405090304" charset="0"/>
+                <a:cs typeface="Times New Roman Regular" panose="02020503050405090304" charset="0"/>
+              </a:rPr>
+              <a:t>React</a:t>
+            </a:r>
+            <a:endParaRPr sz="1800">
+              <a:latin typeface="Times New Roman Regular" panose="02020503050405090304" charset="0"/>
+              <a:cs typeface="Times New Roman Regular" panose="02020503050405090304" charset="0"/>
+            </a:endParaRPr>
+          </a:p>
+          <a:p>
+            <a:pPr marL="0" lvl="0" indent="0" algn="l" rtl="0">
+              <a:spcBef>
+                <a:spcPts val="0"/>
+              </a:spcBef>
+              <a:spcAft>
+                <a:spcPts val="1200"/>
+              </a:spcAft>
+              <a:buNone/>
+            </a:pPr>
+            <a:r>
+              <a:rPr lang="zh-CN" sz="1800">
+                <a:latin typeface="Times New Roman Regular" panose="02020503050405090304" charset="0"/>
+                <a:cs typeface="Times New Roman Regular" panose="02020503050405090304" charset="0"/>
+              </a:rPr>
+              <a:t>后端：</a:t>
+            </a:r>
+            <a:r>
+              <a:rPr lang="en-US" altLang="zh-CN" sz="1800">
+                <a:latin typeface="Times New Roman Regular" panose="02020503050405090304" charset="0"/>
+                <a:cs typeface="Times New Roman Regular" panose="02020503050405090304" charset="0"/>
+              </a:rPr>
+              <a:t>Flask, ...</a:t>
+            </a:r>
+            <a:endParaRPr lang="en-US" altLang="zh-CN" sz="1800">
+              <a:latin typeface="Times New Roman Regular" panose="02020503050405090304" charset="0"/>
+              <a:cs typeface="Times New Roman Regular" panose="02020503050405090304" charset="0"/>
+            </a:endParaRPr>
+          </a:p>
+          <a:p>
+            <a:pPr marL="0" lvl="0" indent="0" algn="l" rtl="0">
+              <a:spcBef>
+                <a:spcPts val="0"/>
+              </a:spcBef>
+              <a:spcAft>
+                <a:spcPts val="1200"/>
+              </a:spcAft>
+              <a:buNone/>
+            </a:pPr>
+            <a:r>
+              <a:rPr lang="en-US" altLang="zh-CN" sz="1800">
+                <a:latin typeface="Times New Roman Regular" panose="02020503050405090304" charset="0"/>
+                <a:cs typeface="Times New Roman Regular" panose="02020503050405090304" charset="0"/>
+              </a:rPr>
+              <a:t>使用 Axios 库来处理 HTTP 请求，以与后端 API 进行通信。</a:t>
+            </a:r>
+            <a:endParaRPr lang="en-US" altLang="zh-CN" sz="1800">
+              <a:latin typeface="Times New Roman Regular" panose="02020503050405090304" charset="0"/>
+              <a:cs typeface="Times New Roman Regular" panose="02020503050405090304" charset="0"/>
+            </a:endParaRPr>
+          </a:p>
+          <a:p>
+            <a:pPr marL="0" lvl="0" indent="0" algn="l" rtl="0">
+              <a:spcBef>
+                <a:spcPts val="0"/>
+              </a:spcBef>
+              <a:spcAft>
+                <a:spcPts val="1200"/>
+              </a:spcAft>
+              <a:buNone/>
+            </a:pPr>
+            <a:r>
+              <a:rPr lang="en-US" altLang="zh-CN" sz="1800">
+                <a:latin typeface="Times New Roman Regular" panose="02020503050405090304" charset="0"/>
+                <a:cs typeface="Times New Roman Regular" panose="02020503050405090304" charset="0"/>
+              </a:rPr>
+              <a:t>Deploy</a:t>
+            </a:r>
+            <a:r>
+              <a:rPr lang="zh-CN" altLang="en-US" sz="1800">
+                <a:latin typeface="Times New Roman Regular" panose="02020503050405090304" charset="0"/>
+                <a:cs typeface="Times New Roman Regular" panose="02020503050405090304" charset="0"/>
+              </a:rPr>
+              <a:t>在</a:t>
+            </a:r>
+            <a:r>
+              <a:rPr lang="en-US" altLang="zh-CN" sz="1800">
+                <a:latin typeface="Times New Roman Regular" panose="02020503050405090304" charset="0"/>
+                <a:cs typeface="Times New Roman Regular" panose="02020503050405090304" charset="0"/>
+              </a:rPr>
+              <a:t>...</a:t>
+            </a:r>
+            <a:r>
+              <a:rPr lang="zh-CN" altLang="en-US" sz="1800">
+                <a:latin typeface="Times New Roman Regular" panose="02020503050405090304" charset="0"/>
+                <a:cs typeface="Times New Roman Regular" panose="02020503050405090304" charset="0"/>
+              </a:rPr>
+              <a:t>上</a:t>
+            </a:r>
+            <a:endParaRPr lang="zh-CN" altLang="en-US" sz="1800">
+              <a:latin typeface="Times New Roman Regular" panose="02020503050405090304" charset="0"/>
+              <a:cs typeface="Times New Roman Regular" panose="02020503050405090304" charset="0"/>
+            </a:endParaRPr>
+          </a:p>
+        </p:txBody>
+      </p:sp>
+      <p:sp>
+        <p:nvSpPr>
+          <p:cNvPr id="2" name="Slide Number Placeholder 1"/>
+          <p:cNvSpPr>
+            <a:spLocks noGrp="1"/>
+          </p:cNvSpPr>
+          <p:nvPr>
+            <p:ph type="sldNum" idx="12"/>
+          </p:nvPr>
+        </p:nvSpPr>
+        <p:spPr/>
+        <p:txBody>
+          <a:bodyPr/>
+          <a:p>
+            <a:pPr marL="0" lvl="0" indent="0" algn="r" rtl="0">
+              <a:spcBef>
+                <a:spcPts val="0"/>
+              </a:spcBef>
+              <a:spcAft>
+                <a:spcPts val="0"/>
+              </a:spcAft>
+              <a:buNone/>
+            </a:pPr>
+            <a:fld id="{00000000-1234-1234-1234-123412341234}" type="slidenum">
+              <a:rPr lang="en-GB"/>
+            </a:fld>
+            <a:endParaRPr lang="en-GB"/>
+          </a:p>
+        </p:txBody>
+      </p:sp>
+      <p:sp>
+        <p:nvSpPr>
+          <p:cNvPr id="139" name="Google Shape;139;p15"/>
+          <p:cNvSpPr txBox="1"/>
+          <p:nvPr>
+            <p:ph type="title"/>
+          </p:nvPr>
+        </p:nvSpPr>
+        <p:spPr>
+          <a:xfrm>
+            <a:off x="819150" y="495300"/>
+            <a:ext cx="7505700" cy="753745"/>
+          </a:xfrm>
+          <a:prstGeom prst="rect">
+            <a:avLst/>
+          </a:prstGeom>
+        </p:spPr>
+        <p:txBody>
+          <a:bodyPr spcFirstLastPara="1" wrap="square" lIns="91425" tIns="91425" rIns="91425" bIns="91425" anchor="t" anchorCtr="0">
+            <a:normAutofit/>
+          </a:bodyPr>
+          <a:p>
+            <a:pPr marL="0" lvl="0" indent="0" algn="l" rtl="0">
+              <a:spcBef>
+                <a:spcPts val="0"/>
+              </a:spcBef>
+              <a:spcAft>
+                <a:spcPts val="0"/>
+              </a:spcAft>
+              <a:buNone/>
+            </a:pPr>
+            <a:r>
+              <a:rPr lang="en-US">
+                <a:sym typeface="+mn-ea"/>
+              </a:rPr>
+              <a:t>Project </a:t>
+            </a:r>
+            <a:r>
+              <a:rPr lang="en-US">
+                <a:sym typeface="+mn-ea"/>
+              </a:rPr>
+              <a:t>Introduction</a:t>
+            </a:r>
+            <a:endParaRPr lang="en-US">
+              <a:sym typeface="+mn-ea"/>
+            </a:endParaRPr>
+          </a:p>
+        </p:txBody>
+      </p:sp>
+    </p:spTree>
+  </p:cSld>
+  <p:clrMapOvr>
+    <a:masterClrMapping/>
+  </p:clrMapOvr>
+  <mc:AlternateContent xmlns:mc="http://schemas.openxmlformats.org/markup-compatibility/2006">
+    <mc:Choice xmlns:p14="http://schemas.microsoft.com/office/powerpoint/2010/main" Requires="p14">
+      <p:transition spd="slow" p14:dur="1000">
+        <p:push dir="u"/>
+      </p:transition>
+    </mc:Choice>
+    <mc:Fallback>
+      <p:transition spd="slow">
+        <p:push dir="u"/>
+      </p:transition>
+    </mc:Fallback>
+  </mc:AlternateContent>
+</p:sld>
+</file>
+
+<file path=ppt/slides/slide5.xml><?xml version="1.0" encoding="utf-8"?>
 <p:sld xmlns:a="http://schemas.openxmlformats.org/drawingml/2006/main" xmlns:r="http://schemas.openxmlformats.org/officeDocument/2006/relationships" xmlns:p="http://schemas.openxmlformats.org/presentationml/2006/main">
   <p:cSld>
     <p:spTree>
@@ -10048,7 +11221,7 @@
 </p:sld>
 </file>
 
-<file path=ppt/slides/slide4.xml><?xml version="1.0" encoding="utf-8"?>
+<file path=ppt/slides/slide6.xml><?xml version="1.0" encoding="utf-8"?>
 <p:sld xmlns:a="http://schemas.openxmlformats.org/drawingml/2006/main" xmlns:r="http://schemas.openxmlformats.org/officeDocument/2006/relationships" xmlns:p="http://schemas.openxmlformats.org/presentationml/2006/main">
   <p:cSld>
     <p:spTree>
@@ -10143,8 +11316,8 @@
         </p:nvSpPr>
         <p:spPr>
           <a:xfrm>
-            <a:off x="6378575" y="348615"/>
-            <a:ext cx="1353820" cy="481965"/>
+            <a:off x="5738495" y="348615"/>
+            <a:ext cx="2276475" cy="481965"/>
           </a:xfrm>
           <a:prstGeom prst="rect">
             <a:avLst/>
@@ -10156,7 +11329,7 @@
         </p:spPr>
         <p:txBody>
           <a:bodyPr wrap="square" lIns="91425" tIns="91425" rIns="91425" bIns="91425" anchor="t" anchorCtr="0">
-            <a:normAutofit lnSpcReduction="10000"/>
+            <a:normAutofit fontScale="90000"/>
           </a:bodyPr>
           <a:lstStyle>
             <a:defPPr marR="0" lvl="0" algn="l" rtl="0">
@@ -10429,7 +11602,21 @@
               </a:rPr>
               <a:t>框架</a:t>
             </a:r>
-            <a:endParaRPr lang="zh-CN" sz="1800">
+            <a:r>
+              <a:rPr lang="en-US" altLang="zh-CN" sz="1800">
+                <a:latin typeface="Times New Roman Regular" panose="02020503050405090304" charset="0"/>
+                <a:cs typeface="Times New Roman Regular" panose="02020503050405090304" charset="0"/>
+              </a:rPr>
+              <a:t>，component</a:t>
+            </a:r>
+            <a:r>
+              <a:rPr lang="en-US" altLang="zh-CN" sz="1800">
+                <a:latin typeface="Times New Roman Regular" panose="02020503050405090304" charset="0"/>
+                <a:cs typeface="Times New Roman Regular" panose="02020503050405090304" charset="0"/>
+              </a:rPr>
+              <a:t>s</a:t>
+            </a:r>
+            <a:endParaRPr lang="en-US" altLang="zh-CN" sz="1800">
               <a:latin typeface="Times New Roman Regular" panose="02020503050405090304" charset="0"/>
               <a:cs typeface="Times New Roman Regular" panose="02020503050405090304" charset="0"/>
             </a:endParaRPr>
@@ -10438,7 +11625,7 @@
       </p:sp>
       <p:pic>
         <p:nvPicPr>
-          <p:cNvPr id="4" name="图片 3"/>
+          <p:cNvPr id="3" name="图片 2"/>
           <p:cNvPicPr>
             <a:picLocks noChangeAspect="1"/>
           </p:cNvPicPr>
@@ -10452,14 +11639,56 @@
         </p:blipFill>
         <p:spPr>
           <a:xfrm>
-            <a:off x="939800" y="1039495"/>
-            <a:ext cx="7264400" cy="3683635"/>
+            <a:off x="892810" y="830580"/>
+            <a:ext cx="7598410" cy="3846830"/>
           </a:xfrm>
           <a:prstGeom prst="rect">
             <a:avLst/>
           </a:prstGeom>
         </p:spPr>
       </p:pic>
+      <p:sp>
+        <p:nvSpPr>
+          <p:cNvPr id="5" name="矩形 4"/>
+          <p:cNvSpPr/>
+          <p:nvPr/>
+        </p:nvSpPr>
+        <p:spPr>
+          <a:xfrm>
+            <a:off x="3346450" y="1384935"/>
+            <a:ext cx="2687320" cy="2614295"/>
+          </a:xfrm>
+          <a:prstGeom prst="rect">
+            <a:avLst/>
+          </a:prstGeom>
+          <a:ln>
+            <a:solidFill>
+              <a:srgbClr val="FF0000"/>
+            </a:solidFill>
+          </a:ln>
+        </p:spPr>
+        <p:style>
+          <a:lnRef idx="2">
+            <a:schemeClr val="accent1"/>
+          </a:lnRef>
+          <a:fillRef idx="0">
+            <a:srgbClr val="FFFFFF"/>
+          </a:fillRef>
+          <a:effectRef idx="0">
+            <a:srgbClr val="FFFFFF"/>
+          </a:effectRef>
+          <a:fontRef idx="minor">
+            <a:schemeClr val="lt1"/>
+          </a:fontRef>
+        </p:style>
+        <p:txBody>
+          <a:bodyPr rtlCol="0" anchor="ctr"/>
+          <a:p>
+            <a:pPr algn="ctr"/>
+            <a:endParaRPr lang="zh-CN" altLang="en-US"/>
+          </a:p>
+        </p:txBody>
+      </p:sp>
     </p:spTree>
   </p:cSld>
   <p:clrMapOvr>
@@ -10561,6 +11790,127 @@
                       </p:childTnLst>
                     </p:cTn>
                   </p:par>
+                  <p:par>
+                    <p:cTn id="9" fill="hold">
+                      <p:stCondLst>
+                        <p:cond delay="indefinite"/>
+                      </p:stCondLst>
+                      <p:childTnLst>
+                        <p:par>
+                          <p:cTn id="10" fill="hold">
+                            <p:stCondLst>
+                              <p:cond delay="0"/>
+                            </p:stCondLst>
+                            <p:childTnLst>
+                              <p:par>
+                                <p:cTn id="11" presetID="12" presetClass="entr" presetSubtype="4" fill="hold" nodeType="clickEffect">
+                                  <p:stCondLst>
+                                    <p:cond delay="0"/>
+                                  </p:stCondLst>
+                                  <p:childTnLst>
+                                    <p:set>
+                                      <p:cBhvr>
+                                        <p:cTn id="12" dur="1" fill="hold">
+                                          <p:stCondLst>
+                                            <p:cond delay="0"/>
+                                          </p:stCondLst>
+                                        </p:cTn>
+                                        <p:tgtEl>
+                                          <p:spTgt spid="3"/>
+                                        </p:tgtEl>
+                                        <p:attrNameLst>
+                                          <p:attrName>style.visibility</p:attrName>
+                                        </p:attrNameLst>
+                                      </p:cBhvr>
+                                      <p:to>
+                                        <p:strVal val="visible"/>
+                                      </p:to>
+                                    </p:set>
+                                    <p:anim calcmode="lin" valueType="num">
+                                      <p:cBhvr additive="base">
+                                        <p:cTn id="13" dur="500"/>
+                                        <p:tgtEl>
+                                          <p:spTgt spid="3"/>
+                                        </p:tgtEl>
+                                        <p:attrNameLst>
+                                          <p:attrName>ppt_y</p:attrName>
+                                        </p:attrNameLst>
+                                      </p:cBhvr>
+                                      <p:tavLst>
+                                        <p:tav tm="0">
+                                          <p:val>
+                                            <p:strVal val="#ppt_y+#ppt_h*1.125000"/>
+                                          </p:val>
+                                        </p:tav>
+                                        <p:tav tm="100000">
+                                          <p:val>
+                                            <p:strVal val="#ppt_y"/>
+                                          </p:val>
+                                        </p:tav>
+                                      </p:tavLst>
+                                    </p:anim>
+                                    <p:animEffect transition="in" filter="wipe(up)">
+                                      <p:cBhvr>
+                                        <p:cTn id="14" dur="500"/>
+                                        <p:tgtEl>
+                                          <p:spTgt spid="3"/>
+                                        </p:tgtEl>
+                                      </p:cBhvr>
+                                    </p:animEffect>
+                                  </p:childTnLst>
+                                </p:cTn>
+                              </p:par>
+                            </p:childTnLst>
+                          </p:cTn>
+                        </p:par>
+                      </p:childTnLst>
+                    </p:cTn>
+                  </p:par>
+                  <p:par>
+                    <p:cTn id="15" fill="hold">
+                      <p:stCondLst>
+                        <p:cond delay="indefinite"/>
+                      </p:stCondLst>
+                      <p:childTnLst>
+                        <p:par>
+                          <p:cTn id="16" fill="hold">
+                            <p:stCondLst>
+                              <p:cond delay="0"/>
+                            </p:stCondLst>
+                            <p:childTnLst>
+                              <p:par>
+                                <p:cTn id="17" presetID="1" presetClass="entr" presetSubtype="0" fill="hold" grpId="0" nodeType="clickEffect">
+                                  <p:stCondLst>
+                                    <p:cond delay="0"/>
+                                  </p:stCondLst>
+                                  <p:childTnLst>
+                                    <p:set>
+                                      <p:cBhvr>
+                                        <p:cTn id="18" dur="1" fill="hold">
+                                          <p:stCondLst>
+                                            <p:cond delay="0"/>
+                                          </p:stCondLst>
+                                        </p:cTn>
+                                        <p:tgtEl>
+                                          <p:spTgt spid="5"/>
+                                        </p:tgtEl>
+                                        <p:attrNameLst>
+                                          <p:attrName>style.visibility</p:attrName>
+                                        </p:attrNameLst>
+                                      </p:cBhvr>
+                                      <p:to>
+                                        <p:strVal val="visible"/>
+                                      </p:to>
+                                    </p:set>
+                                  </p:childTnLst>
+                                </p:cTn>
+                              </p:par>
+                            </p:childTnLst>
+                          </p:cTn>
+                        </p:par>
+                      </p:childTnLst>
+                    </p:cTn>
+                  </p:par>
                 </p:childTnLst>
               </p:cTn>
               <p:prevCondLst>
@@ -10585,12 +11935,825 @@
     <p:bldLst>
       <p:bldP spid="1" grpId="0"/>
       <p:bldP spid="1" grpId="1"/>
+      <p:bldP spid="5" grpId="0" animBg="1"/>
+      <p:bldP spid="5" grpId="1" animBg="1"/>
     </p:bldLst>
   </p:timing>
 </p:sld>
 </file>
 
-<file path=ppt/slides/slide5.xml><?xml version="1.0" encoding="utf-8"?>
+<file path=ppt/slides/slide7.xml><?xml version="1.0" encoding="utf-8"?>
+<p:sld xmlns:a="http://schemas.openxmlformats.org/drawingml/2006/main" xmlns:r="http://schemas.openxmlformats.org/officeDocument/2006/relationships" xmlns:p="http://schemas.openxmlformats.org/presentationml/2006/main">
+  <p:cSld>
+    <p:spTree>
+      <p:nvGrpSpPr>
+        <p:cNvPr id="138" name="Shape 138"/>
+        <p:cNvGrpSpPr/>
+        <p:nvPr/>
+      </p:nvGrpSpPr>
+      <p:grpSpPr>
+        <a:xfrm>
+          <a:off x="0" y="0"/>
+          <a:ext cx="0" cy="0"/>
+          <a:chOff x="0" y="0"/>
+          <a:chExt cx="0" cy="0"/>
+        </a:xfrm>
+      </p:grpSpPr>
+      <p:sp>
+        <p:nvSpPr>
+          <p:cNvPr id="139" name="Google Shape;139;p15"/>
+          <p:cNvSpPr txBox="1"/>
+          <p:nvPr>
+            <p:ph type="title"/>
+          </p:nvPr>
+        </p:nvSpPr>
+        <p:spPr>
+          <a:xfrm>
+            <a:off x="819150" y="285750"/>
+            <a:ext cx="7505700" cy="753745"/>
+          </a:xfrm>
+          <a:prstGeom prst="rect">
+            <a:avLst/>
+          </a:prstGeom>
+        </p:spPr>
+        <p:txBody>
+          <a:bodyPr spcFirstLastPara="1" wrap="square" lIns="91425" tIns="91425" rIns="91425" bIns="91425" anchor="t" anchorCtr="0">
+            <a:normAutofit/>
+          </a:bodyPr>
+          <a:lstStyle/>
+          <a:p>
+            <a:pPr marL="0" lvl="0" indent="0" algn="l" rtl="0">
+              <a:spcBef>
+                <a:spcPts val="0"/>
+              </a:spcBef>
+              <a:spcAft>
+                <a:spcPts val="0"/>
+              </a:spcAft>
+              <a:buNone/>
+            </a:pPr>
+            <a:r>
+              <a:rPr lang="en-US"/>
+              <a:t>Front-End</a:t>
+            </a:r>
+            <a:endParaRPr lang="en-US"/>
+          </a:p>
+        </p:txBody>
+      </p:sp>
+      <p:sp>
+        <p:nvSpPr>
+          <p:cNvPr id="2" name="Slide Number Placeholder 1"/>
+          <p:cNvSpPr>
+            <a:spLocks noGrp="1"/>
+          </p:cNvSpPr>
+          <p:nvPr>
+            <p:ph type="sldNum" idx="12"/>
+          </p:nvPr>
+        </p:nvSpPr>
+        <p:spPr/>
+        <p:txBody>
+          <a:bodyPr/>
+          <a:p>
+            <a:pPr marL="0" lvl="0" indent="0" algn="r" rtl="0">
+              <a:spcBef>
+                <a:spcPts val="0"/>
+              </a:spcBef>
+              <a:spcAft>
+                <a:spcPts val="0"/>
+              </a:spcAft>
+              <a:buNone/>
+            </a:pPr>
+            <a:fld id="{00000000-1234-1234-1234-123412341234}" type="slidenum">
+              <a:rPr lang="en-GB"/>
+            </a:fld>
+            <a:endParaRPr lang="en-GB"/>
+          </a:p>
+        </p:txBody>
+      </p:sp>
+      <p:pic>
+        <p:nvPicPr>
+          <p:cNvPr id="4" name="图片 3"/>
+          <p:cNvPicPr>
+            <a:picLocks noChangeAspect="1"/>
+          </p:cNvPicPr>
+          <p:nvPr/>
+        </p:nvPicPr>
+        <p:blipFill>
+          <a:blip r:embed="rId1"/>
+          <a:stretch>
+            <a:fillRect/>
+          </a:stretch>
+        </p:blipFill>
+        <p:spPr>
+          <a:xfrm>
+            <a:off x="939800" y="1039495"/>
+            <a:ext cx="7264400" cy="3683635"/>
+          </a:xfrm>
+          <a:prstGeom prst="rect">
+            <a:avLst/>
+          </a:prstGeom>
+        </p:spPr>
+      </p:pic>
+      <p:sp>
+        <p:nvSpPr>
+          <p:cNvPr id="8" name="矩形 7"/>
+          <p:cNvSpPr/>
+          <p:nvPr/>
+        </p:nvSpPr>
+        <p:spPr>
+          <a:xfrm>
+            <a:off x="828675" y="991235"/>
+            <a:ext cx="7496175" cy="393700"/>
+          </a:xfrm>
+          <a:prstGeom prst="rect">
+            <a:avLst/>
+          </a:prstGeom>
+          <a:ln>
+            <a:solidFill>
+              <a:srgbClr val="FF0000"/>
+            </a:solidFill>
+          </a:ln>
+        </p:spPr>
+        <p:style>
+          <a:lnRef idx="2">
+            <a:schemeClr val="accent1"/>
+          </a:lnRef>
+          <a:fillRef idx="0">
+            <a:srgbClr val="FFFFFF"/>
+          </a:fillRef>
+          <a:effectRef idx="0">
+            <a:srgbClr val="FFFFFF"/>
+          </a:effectRef>
+          <a:fontRef idx="minor">
+            <a:schemeClr val="lt1"/>
+          </a:fontRef>
+        </p:style>
+        <p:txBody>
+          <a:bodyPr rtlCol="0" anchor="ctr"/>
+          <a:p>
+            <a:pPr algn="ctr"/>
+            <a:endParaRPr lang="zh-CN" altLang="en-US"/>
+          </a:p>
+        </p:txBody>
+      </p:sp>
+      <p:sp>
+        <p:nvSpPr>
+          <p:cNvPr id="9" name="矩形 8"/>
+          <p:cNvSpPr/>
+          <p:nvPr/>
+        </p:nvSpPr>
+        <p:spPr>
+          <a:xfrm>
+            <a:off x="828040" y="1260475"/>
+            <a:ext cx="1339850" cy="3536315"/>
+          </a:xfrm>
+          <a:prstGeom prst="rect">
+            <a:avLst/>
+          </a:prstGeom>
+          <a:ln>
+            <a:solidFill>
+              <a:srgbClr val="FF0000"/>
+            </a:solidFill>
+          </a:ln>
+        </p:spPr>
+        <p:style>
+          <a:lnRef idx="2">
+            <a:schemeClr val="accent1"/>
+          </a:lnRef>
+          <a:fillRef idx="0">
+            <a:srgbClr val="FFFFFF"/>
+          </a:fillRef>
+          <a:effectRef idx="0">
+            <a:srgbClr val="FFFFFF"/>
+          </a:effectRef>
+          <a:fontRef idx="minor">
+            <a:schemeClr val="lt1"/>
+          </a:fontRef>
+        </p:style>
+        <p:txBody>
+          <a:bodyPr rtlCol="0" anchor="ctr"/>
+          <a:p>
+            <a:pPr algn="ctr"/>
+            <a:endParaRPr lang="zh-CN" altLang="en-US"/>
+          </a:p>
+        </p:txBody>
+      </p:sp>
+      <p:sp>
+        <p:nvSpPr>
+          <p:cNvPr id="11" name="矩形 10"/>
+          <p:cNvSpPr/>
+          <p:nvPr/>
+        </p:nvSpPr>
+        <p:spPr>
+          <a:xfrm>
+            <a:off x="1992630" y="1261110"/>
+            <a:ext cx="6331585" cy="3536950"/>
+          </a:xfrm>
+          <a:prstGeom prst="rect">
+            <a:avLst/>
+          </a:prstGeom>
+          <a:ln>
+            <a:solidFill>
+              <a:srgbClr val="FF0000"/>
+            </a:solidFill>
+          </a:ln>
+        </p:spPr>
+        <p:style>
+          <a:lnRef idx="2">
+            <a:schemeClr val="accent1"/>
+          </a:lnRef>
+          <a:fillRef idx="0">
+            <a:srgbClr val="FFFFFF"/>
+          </a:fillRef>
+          <a:effectRef idx="0">
+            <a:srgbClr val="FFFFFF"/>
+          </a:effectRef>
+          <a:fontRef idx="minor">
+            <a:schemeClr val="lt1"/>
+          </a:fontRef>
+        </p:style>
+        <p:txBody>
+          <a:bodyPr rtlCol="0" anchor="ctr"/>
+          <a:p>
+            <a:pPr algn="ctr"/>
+            <a:endParaRPr lang="zh-CN" altLang="en-US"/>
+          </a:p>
+        </p:txBody>
+      </p:sp>
+      <p:sp>
+        <p:nvSpPr>
+          <p:cNvPr id="12" name="文本框 11"/>
+          <p:cNvSpPr txBox="1"/>
+          <p:nvPr/>
+        </p:nvSpPr>
+        <p:spPr>
+          <a:xfrm>
+            <a:off x="4175125" y="684530"/>
+            <a:ext cx="794385" cy="306705"/>
+          </a:xfrm>
+          <a:prstGeom prst="rect">
+            <a:avLst/>
+          </a:prstGeom>
+          <a:noFill/>
+        </p:spPr>
+        <p:txBody>
+          <a:bodyPr wrap="square" rtlCol="0">
+            <a:spAutoFit/>
+          </a:bodyPr>
+          <a:p>
+            <a:r>
+              <a:rPr lang="en-US" altLang="zh-CN">
+                <a:solidFill>
+                  <a:srgbClr val="FF0000"/>
+                </a:solidFill>
+              </a:rPr>
+              <a:t>Navbar</a:t>
+            </a:r>
+            <a:endParaRPr lang="en-US" altLang="zh-CN">
+              <a:solidFill>
+                <a:srgbClr val="FF0000"/>
+              </a:solidFill>
+            </a:endParaRPr>
+          </a:p>
+        </p:txBody>
+      </p:sp>
+      <p:sp>
+        <p:nvSpPr>
+          <p:cNvPr id="15" name="文本框 14"/>
+          <p:cNvSpPr txBox="1"/>
+          <p:nvPr/>
+        </p:nvSpPr>
+        <p:spPr>
+          <a:xfrm>
+            <a:off x="146050" y="2727960"/>
+            <a:ext cx="793750" cy="275590"/>
+          </a:xfrm>
+          <a:prstGeom prst="rect">
+            <a:avLst/>
+          </a:prstGeom>
+          <a:noFill/>
+        </p:spPr>
+        <p:txBody>
+          <a:bodyPr wrap="square" rtlCol="0">
+            <a:spAutoFit/>
+          </a:bodyPr>
+          <a:p>
+            <a:r>
+              <a:rPr lang="en-US" altLang="zh-CN" sz="1200">
+                <a:solidFill>
+                  <a:srgbClr val="FF0000"/>
+                </a:solidFill>
+              </a:rPr>
+              <a:t>Sidebar</a:t>
+            </a:r>
+            <a:endParaRPr lang="en-US" altLang="zh-CN" sz="1200">
+              <a:solidFill>
+                <a:srgbClr val="FF0000"/>
+              </a:solidFill>
+            </a:endParaRPr>
+          </a:p>
+        </p:txBody>
+      </p:sp>
+      <p:sp>
+        <p:nvSpPr>
+          <p:cNvPr id="16" name="文本框 15"/>
+          <p:cNvSpPr txBox="1"/>
+          <p:nvPr/>
+        </p:nvSpPr>
+        <p:spPr>
+          <a:xfrm>
+            <a:off x="8324215" y="2727960"/>
+            <a:ext cx="548640" cy="275590"/>
+          </a:xfrm>
+          <a:prstGeom prst="rect">
+            <a:avLst/>
+          </a:prstGeom>
+          <a:noFill/>
+        </p:spPr>
+        <p:txBody>
+          <a:bodyPr wrap="square" rtlCol="0">
+            <a:spAutoFit/>
+          </a:bodyPr>
+          <a:p>
+            <a:r>
+              <a:rPr lang="en-US" altLang="zh-CN" sz="1200">
+                <a:solidFill>
+                  <a:srgbClr val="FF0000"/>
+                </a:solidFill>
+              </a:rPr>
+              <a:t>Page</a:t>
+            </a:r>
+            <a:endParaRPr lang="en-US" altLang="zh-CN" sz="1200">
+              <a:solidFill>
+                <a:srgbClr val="FF0000"/>
+              </a:solidFill>
+            </a:endParaRPr>
+          </a:p>
+        </p:txBody>
+      </p:sp>
+    </p:spTree>
+  </p:cSld>
+  <p:clrMapOvr>
+    <a:masterClrMapping/>
+  </p:clrMapOvr>
+  <mc:AlternateContent xmlns:mc="http://schemas.openxmlformats.org/markup-compatibility/2006">
+    <mc:Choice xmlns:p14="http://schemas.microsoft.com/office/powerpoint/2010/main" Requires="p14">
+      <p:transition spd="slow" p14:dur="1000">
+        <p:push dir="u"/>
+      </p:transition>
+    </mc:Choice>
+    <mc:Fallback>
+      <p:transition spd="slow">
+        <p:push dir="u"/>
+      </p:transition>
+    </mc:Fallback>
+  </mc:AlternateContent>
+  <p:timing>
+    <p:tnLst>
+      <p:par>
+        <p:cTn id="1" dur="indefinite" restart="never" nodeType="tmRoot">
+          <p:childTnLst>
+            <p:seq concurrent="1" nextAc="seek">
+              <p:cTn id="2" dur="indefinite" nodeType="mainSeq">
+                <p:childTnLst>
+                  <p:par>
+                    <p:cTn id="3" fill="hold">
+                      <p:stCondLst>
+                        <p:cond delay="indefinite"/>
+                      </p:stCondLst>
+                      <p:childTnLst>
+                        <p:par>
+                          <p:cTn id="4" fill="hold">
+                            <p:stCondLst>
+                              <p:cond delay="0"/>
+                            </p:stCondLst>
+                            <p:childTnLst>
+                              <p:par>
+                                <p:cTn id="5" presetID="1" presetClass="entr" presetSubtype="0" fill="hold" grpId="0" nodeType="clickEffect">
+                                  <p:stCondLst>
+                                    <p:cond delay="0"/>
+                                  </p:stCondLst>
+                                  <p:childTnLst>
+                                    <p:set>
+                                      <p:cBhvr>
+                                        <p:cTn id="6" dur="1" fill="hold">
+                                          <p:stCondLst>
+                                            <p:cond delay="0"/>
+                                          </p:stCondLst>
+                                        </p:cTn>
+                                        <p:tgtEl>
+                                          <p:spTgt spid="12"/>
+                                        </p:tgtEl>
+                                        <p:attrNameLst>
+                                          <p:attrName>style.visibility</p:attrName>
+                                        </p:attrNameLst>
+                                      </p:cBhvr>
+                                      <p:to>
+                                        <p:strVal val="visible"/>
+                                      </p:to>
+                                    </p:set>
+                                  </p:childTnLst>
+                                </p:cTn>
+                              </p:par>
+                              <p:par>
+                                <p:cTn id="7" presetID="1" presetClass="entr" presetSubtype="0" fill="hold" grpId="2" nodeType="withEffect">
+                                  <p:stCondLst>
+                                    <p:cond delay="0"/>
+                                  </p:stCondLst>
+                                  <p:childTnLst>
+                                    <p:set>
+                                      <p:cBhvr>
+                                        <p:cTn id="8" dur="1" fill="hold">
+                                          <p:stCondLst>
+                                            <p:cond delay="0"/>
+                                          </p:stCondLst>
+                                        </p:cTn>
+                                        <p:tgtEl>
+                                          <p:spTgt spid="8"/>
+                                        </p:tgtEl>
+                                        <p:attrNameLst>
+                                          <p:attrName>style.visibility</p:attrName>
+                                        </p:attrNameLst>
+                                      </p:cBhvr>
+                                      <p:to>
+                                        <p:strVal val="visible"/>
+                                      </p:to>
+                                    </p:set>
+                                  </p:childTnLst>
+                                </p:cTn>
+                              </p:par>
+                            </p:childTnLst>
+                          </p:cTn>
+                        </p:par>
+                      </p:childTnLst>
+                    </p:cTn>
+                  </p:par>
+                  <p:par>
+                    <p:cTn id="9" fill="hold">
+                      <p:stCondLst>
+                        <p:cond delay="indefinite"/>
+                      </p:stCondLst>
+                      <p:childTnLst>
+                        <p:par>
+                          <p:cTn id="10" fill="hold">
+                            <p:stCondLst>
+                              <p:cond delay="0"/>
+                            </p:stCondLst>
+                            <p:childTnLst>
+                              <p:par>
+                                <p:cTn id="11" presetID="1" presetClass="exit" presetSubtype="0" fill="hold" grpId="1" nodeType="clickEffect">
+                                  <p:stCondLst>
+                                    <p:cond delay="0"/>
+                                  </p:stCondLst>
+                                  <p:childTnLst>
+                                    <p:set>
+                                      <p:cBhvr>
+                                        <p:cTn id="12" dur="1" fill="hold">
+                                          <p:stCondLst>
+                                            <p:cond delay="0"/>
+                                          </p:stCondLst>
+                                        </p:cTn>
+                                        <p:tgtEl>
+                                          <p:spTgt spid="12"/>
+                                        </p:tgtEl>
+                                        <p:attrNameLst>
+                                          <p:attrName>style.visibility</p:attrName>
+                                        </p:attrNameLst>
+                                      </p:cBhvr>
+                                      <p:to>
+                                        <p:strVal val="hidden"/>
+                                      </p:to>
+                                    </p:set>
+                                  </p:childTnLst>
+                                </p:cTn>
+                              </p:par>
+                              <p:par>
+                                <p:cTn id="13" presetID="1" presetClass="exit" presetSubtype="0" fill="hold" grpId="3" nodeType="withEffect">
+                                  <p:stCondLst>
+                                    <p:cond delay="0"/>
+                                  </p:stCondLst>
+                                  <p:childTnLst>
+                                    <p:set>
+                                      <p:cBhvr>
+                                        <p:cTn id="14" dur="1" fill="hold">
+                                          <p:stCondLst>
+                                            <p:cond delay="0"/>
+                                          </p:stCondLst>
+                                        </p:cTn>
+                                        <p:tgtEl>
+                                          <p:spTgt spid="8"/>
+                                        </p:tgtEl>
+                                        <p:attrNameLst>
+                                          <p:attrName>style.visibility</p:attrName>
+                                        </p:attrNameLst>
+                                      </p:cBhvr>
+                                      <p:to>
+                                        <p:strVal val="hidden"/>
+                                      </p:to>
+                                    </p:set>
+                                  </p:childTnLst>
+                                </p:cTn>
+                              </p:par>
+                              <p:par>
+                                <p:cTn id="15" presetID="1" presetClass="entr" presetSubtype="0" fill="hold" grpId="2" nodeType="withEffect">
+                                  <p:stCondLst>
+                                    <p:cond delay="0"/>
+                                  </p:stCondLst>
+                                  <p:childTnLst>
+                                    <p:set>
+                                      <p:cBhvr>
+                                        <p:cTn id="16" dur="1" fill="hold">
+                                          <p:stCondLst>
+                                            <p:cond delay="0"/>
+                                          </p:stCondLst>
+                                        </p:cTn>
+                                        <p:tgtEl>
+                                          <p:spTgt spid="9"/>
+                                        </p:tgtEl>
+                                        <p:attrNameLst>
+                                          <p:attrName>style.visibility</p:attrName>
+                                        </p:attrNameLst>
+                                      </p:cBhvr>
+                                      <p:to>
+                                        <p:strVal val="visible"/>
+                                      </p:to>
+                                    </p:set>
+                                  </p:childTnLst>
+                                </p:cTn>
+                              </p:par>
+                              <p:par>
+                                <p:cTn id="17" presetID="1" presetClass="entr" presetSubtype="0" fill="hold" grpId="0" nodeType="withEffect">
+                                  <p:stCondLst>
+                                    <p:cond delay="0"/>
+                                  </p:stCondLst>
+                                  <p:childTnLst>
+                                    <p:set>
+                                      <p:cBhvr>
+                                        <p:cTn id="18" dur="1" fill="hold">
+                                          <p:stCondLst>
+                                            <p:cond delay="0"/>
+                                          </p:stCondLst>
+                                        </p:cTn>
+                                        <p:tgtEl>
+                                          <p:spTgt spid="15"/>
+                                        </p:tgtEl>
+                                        <p:attrNameLst>
+                                          <p:attrName>style.visibility</p:attrName>
+                                        </p:attrNameLst>
+                                      </p:cBhvr>
+                                      <p:to>
+                                        <p:strVal val="visible"/>
+                                      </p:to>
+                                    </p:set>
+                                  </p:childTnLst>
+                                </p:cTn>
+                              </p:par>
+                            </p:childTnLst>
+                          </p:cTn>
+                        </p:par>
+                      </p:childTnLst>
+                    </p:cTn>
+                  </p:par>
+                  <p:par>
+                    <p:cTn id="19" fill="hold">
+                      <p:stCondLst>
+                        <p:cond delay="indefinite"/>
+                      </p:stCondLst>
+                      <p:childTnLst>
+                        <p:par>
+                          <p:cTn id="20" fill="hold">
+                            <p:stCondLst>
+                              <p:cond delay="0"/>
+                            </p:stCondLst>
+                            <p:childTnLst>
+                              <p:par>
+                                <p:cTn id="21" presetID="1" presetClass="exit" presetSubtype="0" fill="hold" grpId="3" nodeType="clickEffect">
+                                  <p:stCondLst>
+                                    <p:cond delay="0"/>
+                                  </p:stCondLst>
+                                  <p:childTnLst>
+                                    <p:set>
+                                      <p:cBhvr>
+                                        <p:cTn id="22" dur="1" fill="hold">
+                                          <p:stCondLst>
+                                            <p:cond delay="0"/>
+                                          </p:stCondLst>
+                                        </p:cTn>
+                                        <p:tgtEl>
+                                          <p:spTgt spid="9"/>
+                                        </p:tgtEl>
+                                        <p:attrNameLst>
+                                          <p:attrName>style.visibility</p:attrName>
+                                        </p:attrNameLst>
+                                      </p:cBhvr>
+                                      <p:to>
+                                        <p:strVal val="hidden"/>
+                                      </p:to>
+                                    </p:set>
+                                  </p:childTnLst>
+                                </p:cTn>
+                              </p:par>
+                              <p:par>
+                                <p:cTn id="23" presetID="1" presetClass="exit" presetSubtype="0" fill="hold" grpId="1" nodeType="withEffect">
+                                  <p:stCondLst>
+                                    <p:cond delay="0"/>
+                                  </p:stCondLst>
+                                  <p:childTnLst>
+                                    <p:set>
+                                      <p:cBhvr>
+                                        <p:cTn id="24" dur="1" fill="hold">
+                                          <p:stCondLst>
+                                            <p:cond delay="0"/>
+                                          </p:stCondLst>
+                                        </p:cTn>
+                                        <p:tgtEl>
+                                          <p:spTgt spid="15"/>
+                                        </p:tgtEl>
+                                        <p:attrNameLst>
+                                          <p:attrName>style.visibility</p:attrName>
+                                        </p:attrNameLst>
+                                      </p:cBhvr>
+                                      <p:to>
+                                        <p:strVal val="hidden"/>
+                                      </p:to>
+                                    </p:set>
+                                  </p:childTnLst>
+                                </p:cTn>
+                              </p:par>
+                              <p:par>
+                                <p:cTn id="25" presetID="1" presetClass="entr" presetSubtype="0" fill="hold" grpId="0" nodeType="withEffect">
+                                  <p:stCondLst>
+                                    <p:cond delay="0"/>
+                                  </p:stCondLst>
+                                  <p:childTnLst>
+                                    <p:set>
+                                      <p:cBhvr>
+                                        <p:cTn id="26" dur="1" fill="hold">
+                                          <p:stCondLst>
+                                            <p:cond delay="0"/>
+                                          </p:stCondLst>
+                                        </p:cTn>
+                                        <p:tgtEl>
+                                          <p:spTgt spid="16"/>
+                                        </p:tgtEl>
+                                        <p:attrNameLst>
+                                          <p:attrName>style.visibility</p:attrName>
+                                        </p:attrNameLst>
+                                      </p:cBhvr>
+                                      <p:to>
+                                        <p:strVal val="visible"/>
+                                      </p:to>
+                                    </p:set>
+                                  </p:childTnLst>
+                                </p:cTn>
+                              </p:par>
+                              <p:par>
+                                <p:cTn id="27" presetID="1" presetClass="entr" presetSubtype="0" fill="hold" grpId="2" nodeType="withEffect">
+                                  <p:stCondLst>
+                                    <p:cond delay="0"/>
+                                  </p:stCondLst>
+                                  <p:childTnLst>
+                                    <p:set>
+                                      <p:cBhvr>
+                                        <p:cTn id="28" dur="1" fill="hold">
+                                          <p:stCondLst>
+                                            <p:cond delay="0"/>
+                                          </p:stCondLst>
+                                        </p:cTn>
+                                        <p:tgtEl>
+                                          <p:spTgt spid="11"/>
+                                        </p:tgtEl>
+                                        <p:attrNameLst>
+                                          <p:attrName>style.visibility</p:attrName>
+                                        </p:attrNameLst>
+                                      </p:cBhvr>
+                                      <p:to>
+                                        <p:strVal val="visible"/>
+                                      </p:to>
+                                    </p:set>
+                                  </p:childTnLst>
+                                </p:cTn>
+                              </p:par>
+                            </p:childTnLst>
+                          </p:cTn>
+                        </p:par>
+                      </p:childTnLst>
+                    </p:cTn>
+                  </p:par>
+                  <p:par>
+                    <p:cTn id="29" fill="hold">
+                      <p:stCondLst>
+                        <p:cond delay="indefinite"/>
+                      </p:stCondLst>
+                      <p:childTnLst>
+                        <p:par>
+                          <p:cTn id="30" fill="hold">
+                            <p:stCondLst>
+                              <p:cond delay="0"/>
+                            </p:stCondLst>
+                            <p:childTnLst>
+                              <p:par>
+                                <p:cTn id="31" presetID="1" presetClass="exit" presetSubtype="0" fill="hold" grpId="3" nodeType="clickEffect">
+                                  <p:stCondLst>
+                                    <p:cond delay="0"/>
+                                  </p:stCondLst>
+                                  <p:childTnLst>
+                                    <p:set>
+                                      <p:cBhvr>
+                                        <p:cTn id="32" dur="1" fill="hold">
+                                          <p:stCondLst>
+                                            <p:cond delay="0"/>
+                                          </p:stCondLst>
+                                        </p:cTn>
+                                        <p:tgtEl>
+                                          <p:spTgt spid="11"/>
+                                        </p:tgtEl>
+                                        <p:attrNameLst>
+                                          <p:attrName>style.visibility</p:attrName>
+                                        </p:attrNameLst>
+                                      </p:cBhvr>
+                                      <p:to>
+                                        <p:strVal val="hidden"/>
+                                      </p:to>
+                                    </p:set>
+                                  </p:childTnLst>
+                                </p:cTn>
+                              </p:par>
+                              <p:par>
+                                <p:cTn id="33" presetID="1" presetClass="exit" presetSubtype="0" fill="hold" grpId="1" nodeType="withEffect">
+                                  <p:stCondLst>
+                                    <p:cond delay="0"/>
+                                  </p:stCondLst>
+                                  <p:childTnLst>
+                                    <p:set>
+                                      <p:cBhvr>
+                                        <p:cTn id="34" dur="1" fill="hold">
+                                          <p:stCondLst>
+                                            <p:cond delay="0"/>
+                                          </p:stCondLst>
+                                        </p:cTn>
+                                        <p:tgtEl>
+                                          <p:spTgt spid="16"/>
+                                        </p:tgtEl>
+                                        <p:attrNameLst>
+                                          <p:attrName>style.visibility</p:attrName>
+                                        </p:attrNameLst>
+                                      </p:cBhvr>
+                                      <p:to>
+                                        <p:strVal val="hidden"/>
+                                      </p:to>
+                                    </p:set>
+                                  </p:childTnLst>
+                                </p:cTn>
+                              </p:par>
+                            </p:childTnLst>
+                          </p:cTn>
+                        </p:par>
+                      </p:childTnLst>
+                    </p:cTn>
+                  </p:par>
+                </p:childTnLst>
+              </p:cTn>
+              <p:prevCondLst>
+                <p:cond evt="onPrev" delay="0">
+                  <p:tgtEl>
+                    <p:sldTgt/>
+                  </p:tgtEl>
+                </p:cond>
+              </p:prevCondLst>
+              <p:nextCondLst>
+                <p:cond evt="onNext" delay="0">
+                  <p:tgtEl>
+                    <p:sldTgt/>
+                  </p:tgtEl>
+                </p:cond>
+              </p:nextCondLst>
+            </p:seq>
+          </p:childTnLst>
+        </p:cTn>
+      </p:par>
+    </p:tnLst>
+    <p:bldLst>
+      <p:bldP spid="11" grpId="1" animBg="1"/>
+      <p:bldP spid="9" grpId="1" animBg="1"/>
+      <p:bldP spid="8" grpId="1" animBg="1"/>
+      <p:bldP spid="12" grpId="0"/>
+      <p:bldP spid="8" grpId="2" animBg="1"/>
+      <p:bldP spid="12" grpId="1"/>
+      <p:bldP spid="8" grpId="3" animBg="1"/>
+      <p:bldP spid="9" grpId="2" animBg="1"/>
+      <p:bldP spid="15" grpId="0"/>
+      <p:bldP spid="9" grpId="3" animBg="1"/>
+      <p:bldP spid="15" grpId="1"/>
+      <p:bldP spid="16" grpId="0"/>
+      <p:bldP spid="11" grpId="2" animBg="1"/>
+      <p:bldP spid="11" grpId="3" animBg="1"/>
+      <p:bldP spid="16" grpId="1"/>
+    </p:bldLst>
+  </p:timing>
+</p:sld>
+</file>
+
+<file path=ppt/slides/slide8.xml><?xml version="1.0" encoding="utf-8"?>
 <p:sld xmlns:a="http://schemas.openxmlformats.org/drawingml/2006/main" xmlns:r="http://schemas.openxmlformats.org/officeDocument/2006/relationships" xmlns:p="http://schemas.openxmlformats.org/presentationml/2006/main">
   <p:cSld>
     <p:spTree>
@@ -10617,8 +12780,8 @@
         </p:nvSpPr>
         <p:spPr>
           <a:xfrm>
-            <a:off x="1630045" y="1421765"/>
-            <a:ext cx="5883910" cy="3016885"/>
+            <a:off x="654685" y="1289050"/>
+            <a:ext cx="3650615" cy="3163570"/>
           </a:xfrm>
           <a:prstGeom prst="rect">
             <a:avLst/>
@@ -10644,7 +12807,7 @@
                 <a:latin typeface="Times New Roman Regular" panose="02020503050405090304" charset="0"/>
                 <a:cs typeface="Times New Roman Regular" panose="02020503050405090304" charset="0"/>
               </a:rPr>
-              <a:t>React 是一个用于构建用户界面的 JavaScript 库。</a:t>
+              <a:t>使用了 Material-UI 组件库来构建用户界面。</a:t>
             </a:r>
             <a:endParaRPr sz="1800">
               <a:latin typeface="Times New Roman Regular" panose="02020503050405090304" charset="0"/>
@@ -10661,113 +12824,12 @@
               </a:spcAft>
               <a:buNone/>
             </a:pPr>
-            <a:endParaRPr sz="1800">
-              <a:latin typeface="Times New Roman Regular" panose="02020503050405090304" charset="0"/>
-              <a:cs typeface="Times New Roman Regular" panose="02020503050405090304" charset="0"/>
-            </a:endParaRPr>
-          </a:p>
-          <a:p>
-            <a:pPr marL="0" lvl="0" indent="0" algn="l" rtl="0">
-              <a:spcBef>
-                <a:spcPts val="0"/>
-              </a:spcBef>
-              <a:spcAft>
-                <a:spcPts val="1200"/>
-              </a:spcAft>
-              <a:buNone/>
-            </a:pPr>
-            <a:r>
-              <a:rPr lang="zh-CN" sz="1800">
-                <a:latin typeface="Times New Roman Regular" panose="02020503050405090304" charset="0"/>
-                <a:cs typeface="Times New Roman Regular" panose="02020503050405090304" charset="0"/>
-              </a:rPr>
-              <a:t>我们</a:t>
-            </a:r>
             <a:r>
               <a:rPr sz="1800">
                 <a:latin typeface="Times New Roman Regular" panose="02020503050405090304" charset="0"/>
                 <a:cs typeface="Times New Roman Regular" panose="02020503050405090304" charset="0"/>
               </a:rPr>
-              <a:t>可以把它想象成搭建网站或应用的“乐高积木”</a:t>
-            </a:r>
-            <a:r>
-              <a:rPr lang="zh-CN" sz="1800">
-                <a:latin typeface="Times New Roman Regular" panose="02020503050405090304" charset="0"/>
-                <a:ea typeface="宋体" charset="0"/>
-                <a:cs typeface="Times New Roman Regular" panose="02020503050405090304" charset="0"/>
-              </a:rPr>
-              <a:t>，</a:t>
-            </a:r>
-            <a:r>
-              <a:rPr sz="1800">
-                <a:latin typeface="Times New Roman Regular" panose="02020503050405090304" charset="0"/>
-                <a:cs typeface="Times New Roman Regular" panose="02020503050405090304" charset="0"/>
-              </a:rPr>
-              <a:t>每个乐高积木就是一个 UI </a:t>
-            </a:r>
-            <a:r>
-              <a:rPr sz="1800">
-                <a:solidFill>
-                  <a:schemeClr val="accent2"/>
-                </a:solidFill>
-                <a:latin typeface="Times New Roman Regular" panose="02020503050405090304" charset="0"/>
-                <a:cs typeface="Times New Roman Regular" panose="02020503050405090304" charset="0"/>
-              </a:rPr>
-              <a:t>组件</a:t>
-            </a:r>
-            <a:r>
-              <a:rPr lang="zh-CN" sz="1800">
-                <a:solidFill>
-                  <a:schemeClr val="accent2"/>
-                </a:solidFill>
-                <a:latin typeface="Times New Roman Regular" panose="02020503050405090304" charset="0"/>
-                <a:ea typeface="宋体" charset="0"/>
-                <a:cs typeface="Times New Roman Regular" panose="02020503050405090304" charset="0"/>
-              </a:rPr>
-              <a:t>（</a:t>
-            </a:r>
-            <a:r>
-              <a:rPr lang="en-US" altLang="zh-CN" sz="1800">
-                <a:solidFill>
-                  <a:schemeClr val="accent2"/>
-                </a:solidFill>
-                <a:latin typeface="Times New Roman Regular" panose="02020503050405090304" charset="0"/>
-                <a:ea typeface="宋体" charset="0"/>
-                <a:cs typeface="Times New Roman Regular" panose="02020503050405090304" charset="0"/>
-              </a:rPr>
-              <a:t>component</a:t>
-            </a:r>
-            <a:r>
-              <a:rPr lang="zh-CN" sz="1800">
-                <a:solidFill>
-                  <a:schemeClr val="accent2"/>
-                </a:solidFill>
-                <a:latin typeface="Times New Roman Regular" panose="02020503050405090304" charset="0"/>
-                <a:ea typeface="宋体" charset="0"/>
-                <a:cs typeface="Times New Roman Regular" panose="02020503050405090304" charset="0"/>
-              </a:rPr>
-              <a:t>）</a:t>
-            </a:r>
-            <a:r>
-              <a:rPr sz="1800">
-                <a:latin typeface="Times New Roman Regular" panose="02020503050405090304" charset="0"/>
-                <a:cs typeface="Times New Roman Regular" panose="02020503050405090304" charset="0"/>
-              </a:rPr>
-              <a:t>，把它们组合在一起</a:t>
-            </a:r>
-            <a:r>
-              <a:rPr lang="zh-CN" sz="1800">
-                <a:latin typeface="Times New Roman Regular" panose="02020503050405090304" charset="0"/>
-                <a:cs typeface="Times New Roman Regular" panose="02020503050405090304" charset="0"/>
-              </a:rPr>
-              <a:t>就可以</a:t>
-            </a:r>
-            <a:r>
-              <a:rPr sz="1800">
-                <a:latin typeface="Times New Roman Regular" panose="02020503050405090304" charset="0"/>
-                <a:cs typeface="Times New Roman Regular" panose="02020503050405090304" charset="0"/>
-              </a:rPr>
-              <a:t>形成一个完整的界面。</a:t>
+              <a:t>Material-UI 提供了一组丰富的、易于使用的 UI 组件，使我们的开发过程更加高效，并确保了应用的一致性和响应性。</a:t>
             </a:r>
             <a:endParaRPr sz="1800">
               <a:latin typeface="Times New Roman Regular" panose="02020503050405090304" charset="0"/>
@@ -10847,6 +12909,72 @@
           </a:p>
         </p:txBody>
       </p:sp>
+      <p:pic>
+        <p:nvPicPr>
+          <p:cNvPr id="4" name="图片 3"/>
+          <p:cNvPicPr>
+            <a:picLocks noChangeAspect="1"/>
+          </p:cNvPicPr>
+          <p:nvPr/>
+        </p:nvPicPr>
+        <p:blipFill>
+          <a:blip r:embed="rId1"/>
+          <a:stretch>
+            <a:fillRect/>
+          </a:stretch>
+        </p:blipFill>
+        <p:spPr>
+          <a:xfrm>
+            <a:off x="4462145" y="690880"/>
+            <a:ext cx="4029710" cy="3761740"/>
+          </a:xfrm>
+          <a:prstGeom prst="rect">
+            <a:avLst/>
+          </a:prstGeom>
+        </p:spPr>
+      </p:pic>
+      <p:sp>
+        <p:nvSpPr>
+          <p:cNvPr id="6" name="矩形 5"/>
+          <p:cNvSpPr/>
+          <p:nvPr/>
+        </p:nvSpPr>
+        <p:spPr>
+          <a:xfrm>
+            <a:off x="5285105" y="1595120"/>
+            <a:ext cx="2231390" cy="650875"/>
+          </a:xfrm>
+          <a:prstGeom prst="rect">
+            <a:avLst/>
+          </a:prstGeom>
+          <a:ln>
+            <a:solidFill>
+              <a:srgbClr val="FF0000"/>
+            </a:solidFill>
+          </a:ln>
+        </p:spPr>
+        <p:style>
+          <a:lnRef idx="2">
+            <a:schemeClr val="accent1"/>
+          </a:lnRef>
+          <a:fillRef idx="0">
+            <a:srgbClr val="FFFFFF"/>
+          </a:fillRef>
+          <a:effectRef idx="0">
+            <a:srgbClr val="FFFFFF"/>
+          </a:effectRef>
+          <a:fontRef idx="minor">
+            <a:schemeClr val="lt1"/>
+          </a:fontRef>
+        </p:style>
+        <p:txBody>
+          <a:bodyPr rtlCol="0" anchor="ctr"/>
+          <a:p>
+            <a:pPr algn="ctr"/>
+            <a:endParaRPr lang="zh-CN" altLang="en-US"/>
+          </a:p>
+        </p:txBody>
+      </p:sp>
     </p:spTree>
   </p:cSld>
   <p:clrMapOvr>
@@ -10864,10 +12992,116 @@
       </p:transition>
     </mc:Fallback>
   </mc:AlternateContent>
+  <p:timing>
+    <p:tnLst>
+      <p:par>
+        <p:cTn id="1" dur="indefinite" restart="never" nodeType="tmRoot">
+          <p:childTnLst>
+            <p:seq concurrent="1" nextAc="seek">
+              <p:cTn id="2" dur="indefinite" nodeType="mainSeq">
+                <p:childTnLst>
+                  <p:par>
+                    <p:cTn id="3" fill="hold">
+                      <p:stCondLst>
+                        <p:cond delay="indefinite"/>
+                      </p:stCondLst>
+                      <p:childTnLst>
+                        <p:par>
+                          <p:cTn id="4" fill="hold">
+                            <p:stCondLst>
+                              <p:cond delay="0"/>
+                            </p:stCondLst>
+                            <p:childTnLst>
+                              <p:par>
+                                <p:cTn id="5" presetID="1" presetClass="entr" presetSubtype="0" fill="hold" grpId="0" nodeType="clickEffect">
+                                  <p:stCondLst>
+                                    <p:cond delay="0"/>
+                                  </p:stCondLst>
+                                  <p:childTnLst>
+                                    <p:set>
+                                      <p:cBhvr>
+                                        <p:cTn id="6" dur="1" fill="hold">
+                                          <p:stCondLst>
+                                            <p:cond delay="0"/>
+                                          </p:stCondLst>
+                                        </p:cTn>
+                                        <p:tgtEl>
+                                          <p:spTgt spid="6"/>
+                                        </p:tgtEl>
+                                        <p:attrNameLst>
+                                          <p:attrName>style.visibility</p:attrName>
+                                        </p:attrNameLst>
+                                      </p:cBhvr>
+                                      <p:to>
+                                        <p:strVal val="visible"/>
+                                      </p:to>
+                                    </p:set>
+                                  </p:childTnLst>
+                                </p:cTn>
+                              </p:par>
+                              <p:par>
+                                <p:cTn id="7" presetID="1" presetClass="entr" presetSubtype="0" fill="hold" nodeType="withEffect">
+                                  <p:stCondLst>
+                                    <p:cond delay="0"/>
+                                  </p:stCondLst>
+                                  <p:childTnLst>
+                                    <p:set>
+                                      <p:cBhvr>
+                                        <p:cTn id="8" dur="1" fill="hold">
+                                          <p:stCondLst>
+                                            <p:cond delay="0"/>
+                                          </p:stCondLst>
+                                        </p:cTn>
+                                        <p:tgtEl>
+                                          <p:spTgt spid="4"/>
+                                        </p:tgtEl>
+                                        <p:attrNameLst>
+                                          <p:attrName>style.visibility</p:attrName>
+                                        </p:attrNameLst>
+                                      </p:cBhvr>
+                                      <p:to>
+                                        <p:strVal val="visible"/>
+                                      </p:to>
+                                    </p:set>
+                                  </p:childTnLst>
+                                </p:cTn>
+                              </p:par>
+                            </p:childTnLst>
+                          </p:cTn>
+                        </p:par>
+                      </p:childTnLst>
+                    </p:cTn>
+                  </p:par>
+                </p:childTnLst>
+              </p:cTn>
+              <p:prevCondLst>
+                <p:cond evt="onPrev" delay="0">
+                  <p:tgtEl>
+                    <p:sldTgt/>
+                  </p:tgtEl>
+                </p:cond>
+              </p:prevCondLst>
+              <p:nextCondLst>
+                <p:cond evt="onNext" delay="0">
+                  <p:tgtEl>
+                    <p:sldTgt/>
+                  </p:tgtEl>
+                </p:cond>
+              </p:nextCondLst>
+            </p:seq>
+          </p:childTnLst>
+        </p:cTn>
+      </p:par>
+    </p:tnLst>
+    <p:bldLst>
+      <p:bldP spid="6" grpId="0" animBg="1"/>
+      <p:bldP spid="6" grpId="1" animBg="1"/>
+    </p:bldLst>
+  </p:timing>
 </p:sld>
 </file>
 
-<file path=ppt/slides/slide6.xml><?xml version="1.0" encoding="utf-8"?>
+<file path=ppt/slides/slide9.xml><?xml version="1.0" encoding="utf-8"?>
 <p:sld xmlns:a="http://schemas.openxmlformats.org/drawingml/2006/main" xmlns:r="http://schemas.openxmlformats.org/officeDocument/2006/relationships" xmlns:p="http://schemas.openxmlformats.org/presentationml/2006/main">
   <p:cSld>
     <p:spTree>
@@ -10961,444 +13195,6 @@
                 <a:effectLst/>
               </a:rPr>
               <a:t>Back - End</a:t>
-            </a:r>
-            <a:endParaRPr lang="en-US" altLang="zh-CN" sz="6600" b="1">
-              <a:ln w="22225">
-                <a:solidFill>
-                  <a:sysClr val="windowText" lastClr="000000"/>
-                </a:solidFill>
-                <a:prstDash val="solid"/>
-              </a:ln>
-              <a:solidFill>
-                <a:schemeClr val="tx2">
-                  <a:lumMod val="90000"/>
-                </a:schemeClr>
-              </a:solidFill>
-              <a:effectLst/>
-            </a:endParaRPr>
-          </a:p>
-        </p:txBody>
-      </p:sp>
-    </p:spTree>
-  </p:cSld>
-  <p:clrMapOvr>
-    <a:masterClrMapping/>
-  </p:clrMapOvr>
-  <mc:AlternateContent xmlns:mc="http://schemas.openxmlformats.org/markup-compatibility/2006">
-    <mc:Choice xmlns:p14="http://schemas.microsoft.com/office/powerpoint/2010/main" Requires="p14">
-      <p:transition spd="slow" p14:dur="1000">
-        <p:push dir="u"/>
-      </p:transition>
-    </mc:Choice>
-    <mc:Fallback>
-      <p:transition spd="slow">
-        <p:push dir="u"/>
-      </p:transition>
-    </mc:Fallback>
-  </mc:AlternateContent>
-</p:sld>
-</file>
-
-<file path=ppt/slides/slide7.xml><?xml version="1.0" encoding="utf-8"?>
-<p:sld xmlns:a="http://schemas.openxmlformats.org/drawingml/2006/main" xmlns:r="http://schemas.openxmlformats.org/officeDocument/2006/relationships" xmlns:p="http://schemas.openxmlformats.org/presentationml/2006/main">
-  <p:cSld>
-    <p:spTree>
-      <p:nvGrpSpPr>
-        <p:cNvPr id="138" name="Shape 138"/>
-        <p:cNvGrpSpPr/>
-        <p:nvPr/>
-      </p:nvGrpSpPr>
-      <p:grpSpPr>
-        <a:xfrm>
-          <a:off x="0" y="0"/>
-          <a:ext cx="0" cy="0"/>
-          <a:chOff x="0" y="0"/>
-          <a:chExt cx="0" cy="0"/>
-        </a:xfrm>
-      </p:grpSpPr>
-      <p:sp>
-        <p:nvSpPr>
-          <p:cNvPr id="139" name="Google Shape;139;p15"/>
-          <p:cNvSpPr txBox="1"/>
-          <p:nvPr>
-            <p:ph type="title"/>
-          </p:nvPr>
-        </p:nvSpPr>
-        <p:spPr>
-          <a:xfrm>
-            <a:off x="819150" y="495300"/>
-            <a:ext cx="7505700" cy="753745"/>
-          </a:xfrm>
-          <a:prstGeom prst="rect">
-            <a:avLst/>
-          </a:prstGeom>
-        </p:spPr>
-        <p:txBody>
-          <a:bodyPr spcFirstLastPara="1" wrap="square" lIns="91425" tIns="91425" rIns="91425" bIns="91425" anchor="t" anchorCtr="0">
-            <a:normAutofit/>
-          </a:bodyPr>
-          <a:lstStyle/>
-          <a:p>
-            <a:pPr marL="0" lvl="0" indent="0" algn="l" rtl="0">
-              <a:spcBef>
-                <a:spcPts val="0"/>
-              </a:spcBef>
-              <a:spcAft>
-                <a:spcPts val="0"/>
-              </a:spcAft>
-              <a:buNone/>
-            </a:pPr>
-            <a:r>
-              <a:rPr lang="en-US"/>
-              <a:t>Back-End</a:t>
-            </a:r>
-            <a:endParaRPr lang="en-US"/>
-          </a:p>
-        </p:txBody>
-      </p:sp>
-      <p:sp>
-        <p:nvSpPr>
-          <p:cNvPr id="140" name="Google Shape;140;p15"/>
-          <p:cNvSpPr txBox="1"/>
-          <p:nvPr>
-            <p:ph type="body" idx="1"/>
-          </p:nvPr>
-        </p:nvSpPr>
-        <p:spPr>
-          <a:xfrm>
-            <a:off x="819150" y="1249045"/>
-            <a:ext cx="7505700" cy="2941320"/>
-          </a:xfrm>
-          <a:prstGeom prst="rect">
-            <a:avLst/>
-          </a:prstGeom>
-        </p:spPr>
-        <p:txBody>
-          <a:bodyPr spcFirstLastPara="1" wrap="square" lIns="91425" tIns="91425" rIns="91425" bIns="91425" anchor="t" anchorCtr="0">
-            <a:normAutofit lnSpcReduction="10000"/>
-          </a:bodyPr>
-          <a:lstStyle/>
-          <a:p>
-            <a:pPr marL="0" lvl="0" indent="0" algn="l" rtl="0">
-              <a:spcBef>
-                <a:spcPts val="0"/>
-              </a:spcBef>
-              <a:spcAft>
-                <a:spcPts val="1200"/>
-              </a:spcAft>
-              <a:buNone/>
-            </a:pPr>
-            <a:r>
-              <a:rPr lang="en-US" sz="1800">
-                <a:latin typeface="Times New Roman Regular" panose="02020503050405090304" charset="0"/>
-                <a:cs typeface="Times New Roman Regular" panose="02020503050405090304" charset="0"/>
-              </a:rPr>
-              <a:t>To do</a:t>
-            </a:r>
-            <a:endParaRPr lang="en-US" sz="1800">
-              <a:latin typeface="Times New Roman Regular" panose="02020503050405090304" charset="0"/>
-              <a:cs typeface="Times New Roman Regular" panose="02020503050405090304" charset="0"/>
-            </a:endParaRPr>
-          </a:p>
-        </p:txBody>
-      </p:sp>
-      <p:sp>
-        <p:nvSpPr>
-          <p:cNvPr id="2" name="Slide Number Placeholder 1"/>
-          <p:cNvSpPr>
-            <a:spLocks noGrp="1"/>
-          </p:cNvSpPr>
-          <p:nvPr>
-            <p:ph type="sldNum" idx="12"/>
-          </p:nvPr>
-        </p:nvSpPr>
-        <p:spPr/>
-        <p:txBody>
-          <a:bodyPr/>
-          <a:p>
-            <a:pPr marL="0" lvl="0" indent="0" algn="r" rtl="0">
-              <a:spcBef>
-                <a:spcPts val="0"/>
-              </a:spcBef>
-              <a:spcAft>
-                <a:spcPts val="0"/>
-              </a:spcAft>
-              <a:buNone/>
-            </a:pPr>
-            <a:fld id="{00000000-1234-1234-1234-123412341234}" type="slidenum">
-              <a:rPr lang="en-GB"/>
-            </a:fld>
-            <a:endParaRPr lang="en-GB"/>
-          </a:p>
-        </p:txBody>
-      </p:sp>
-    </p:spTree>
-  </p:cSld>
-  <p:clrMapOvr>
-    <a:masterClrMapping/>
-  </p:clrMapOvr>
-  <mc:AlternateContent xmlns:mc="http://schemas.openxmlformats.org/markup-compatibility/2006">
-    <mc:Choice xmlns:p14="http://schemas.microsoft.com/office/powerpoint/2010/main" Requires="p14">
-      <p:transition spd="slow" p14:dur="1000">
-        <p:push dir="u"/>
-      </p:transition>
-    </mc:Choice>
-    <mc:Fallback>
-      <p:transition spd="slow">
-        <p:push dir="u"/>
-      </p:transition>
-    </mc:Fallback>
-  </mc:AlternateContent>
-</p:sld>
-</file>
-
-<file path=ppt/slides/slide8.xml><?xml version="1.0" encoding="utf-8"?>
-<p:sld xmlns:a="http://schemas.openxmlformats.org/drawingml/2006/main" xmlns:r="http://schemas.openxmlformats.org/officeDocument/2006/relationships" xmlns:p="http://schemas.openxmlformats.org/presentationml/2006/main">
-  <p:cSld>
-    <p:spTree>
-      <p:nvGrpSpPr>
-        <p:cNvPr id="138" name="Shape 138"/>
-        <p:cNvGrpSpPr/>
-        <p:nvPr/>
-      </p:nvGrpSpPr>
-      <p:grpSpPr>
-        <a:xfrm>
-          <a:off x="0" y="0"/>
-          <a:ext cx="0" cy="0"/>
-          <a:chOff x="0" y="0"/>
-          <a:chExt cx="0" cy="0"/>
-        </a:xfrm>
-      </p:grpSpPr>
-      <p:sp>
-        <p:nvSpPr>
-          <p:cNvPr id="139" name="Google Shape;139;p15"/>
-          <p:cNvSpPr txBox="1"/>
-          <p:nvPr>
-            <p:ph type="title"/>
-          </p:nvPr>
-        </p:nvSpPr>
-        <p:spPr>
-          <a:xfrm>
-            <a:off x="819150" y="495300"/>
-            <a:ext cx="7505700" cy="753745"/>
-          </a:xfrm>
-          <a:prstGeom prst="rect">
-            <a:avLst/>
-          </a:prstGeom>
-        </p:spPr>
-        <p:txBody>
-          <a:bodyPr spcFirstLastPara="1" wrap="square" lIns="91425" tIns="91425" rIns="91425" bIns="91425" anchor="t" anchorCtr="0">
-            <a:normAutofit/>
-          </a:bodyPr>
-          <a:lstStyle/>
-          <a:p>
-            <a:pPr marL="0" lvl="0" indent="0" algn="l" rtl="0">
-              <a:spcBef>
-                <a:spcPts val="0"/>
-              </a:spcBef>
-              <a:spcAft>
-                <a:spcPts val="0"/>
-              </a:spcAft>
-              <a:buNone/>
-            </a:pPr>
-            <a:r>
-              <a:rPr lang="en-US"/>
-              <a:t>Back-End</a:t>
-            </a:r>
-            <a:endParaRPr lang="en-US"/>
-          </a:p>
-        </p:txBody>
-      </p:sp>
-      <p:sp>
-        <p:nvSpPr>
-          <p:cNvPr id="140" name="Google Shape;140;p15"/>
-          <p:cNvSpPr txBox="1"/>
-          <p:nvPr>
-            <p:ph type="body" idx="1"/>
-          </p:nvPr>
-        </p:nvSpPr>
-        <p:spPr>
-          <a:xfrm>
-            <a:off x="819150" y="1249045"/>
-            <a:ext cx="7505700" cy="2941320"/>
-          </a:xfrm>
-          <a:prstGeom prst="rect">
-            <a:avLst/>
-          </a:prstGeom>
-        </p:spPr>
-        <p:txBody>
-          <a:bodyPr spcFirstLastPara="1" wrap="square" lIns="91425" tIns="91425" rIns="91425" bIns="91425" anchor="t" anchorCtr="0">
-            <a:normAutofit lnSpcReduction="10000"/>
-          </a:bodyPr>
-          <a:lstStyle/>
-          <a:p>
-            <a:pPr marL="0" lvl="0" indent="0" algn="l" rtl="0">
-              <a:spcBef>
-                <a:spcPts val="0"/>
-              </a:spcBef>
-              <a:spcAft>
-                <a:spcPts val="1200"/>
-              </a:spcAft>
-              <a:buNone/>
-            </a:pPr>
-            <a:r>
-              <a:rPr lang="en-US" sz="1800">
-                <a:latin typeface="Times New Roman Regular" panose="02020503050405090304" charset="0"/>
-                <a:cs typeface="Times New Roman Regular" panose="02020503050405090304" charset="0"/>
-              </a:rPr>
-              <a:t>To do</a:t>
-            </a:r>
-            <a:endParaRPr lang="en-US" sz="1800">
-              <a:latin typeface="Times New Roman Regular" panose="02020503050405090304" charset="0"/>
-              <a:cs typeface="Times New Roman Regular" panose="02020503050405090304" charset="0"/>
-            </a:endParaRPr>
-          </a:p>
-        </p:txBody>
-      </p:sp>
-      <p:sp>
-        <p:nvSpPr>
-          <p:cNvPr id="2" name="Slide Number Placeholder 1"/>
-          <p:cNvSpPr>
-            <a:spLocks noGrp="1"/>
-          </p:cNvSpPr>
-          <p:nvPr>
-            <p:ph type="sldNum" idx="12"/>
-          </p:nvPr>
-        </p:nvSpPr>
-        <p:spPr/>
-        <p:txBody>
-          <a:bodyPr/>
-          <a:p>
-            <a:pPr marL="0" lvl="0" indent="0" algn="r" rtl="0">
-              <a:spcBef>
-                <a:spcPts val="0"/>
-              </a:spcBef>
-              <a:spcAft>
-                <a:spcPts val="0"/>
-              </a:spcAft>
-              <a:buNone/>
-            </a:pPr>
-            <a:fld id="{00000000-1234-1234-1234-123412341234}" type="slidenum">
-              <a:rPr lang="en-GB"/>
-            </a:fld>
-            <a:endParaRPr lang="en-GB"/>
-          </a:p>
-        </p:txBody>
-      </p:sp>
-    </p:spTree>
-  </p:cSld>
-  <p:clrMapOvr>
-    <a:masterClrMapping/>
-  </p:clrMapOvr>
-  <mc:AlternateContent xmlns:mc="http://schemas.openxmlformats.org/markup-compatibility/2006">
-    <mc:Choice xmlns:p14="http://schemas.microsoft.com/office/powerpoint/2010/main" Requires="p14">
-      <p:transition spd="slow" p14:dur="1000">
-        <p:push dir="u"/>
-      </p:transition>
-    </mc:Choice>
-    <mc:Fallback>
-      <p:transition spd="slow">
-        <p:push dir="u"/>
-      </p:transition>
-    </mc:Fallback>
-  </mc:AlternateContent>
-</p:sld>
-</file>
-
-<file path=ppt/slides/slide9.xml><?xml version="1.0" encoding="utf-8"?>
-<p:sld xmlns:a="http://schemas.openxmlformats.org/drawingml/2006/main" xmlns:r="http://schemas.openxmlformats.org/officeDocument/2006/relationships" xmlns:p="http://schemas.openxmlformats.org/presentationml/2006/main">
-  <p:cSld>
-    <p:spTree>
-      <p:nvGrpSpPr>
-        <p:cNvPr id="1" name=""/>
-        <p:cNvGrpSpPr/>
-        <p:nvPr/>
-      </p:nvGrpSpPr>
-      <p:grpSpPr/>
-      <p:sp>
-        <p:nvSpPr>
-          <p:cNvPr id="4" name="Slide Number Placeholder 3"/>
-          <p:cNvSpPr>
-            <a:spLocks noGrp="1"/>
-          </p:cNvSpPr>
-          <p:nvPr>
-            <p:ph type="sldNum" idx="12"/>
-          </p:nvPr>
-        </p:nvSpPr>
-        <p:spPr/>
-        <p:txBody>
-          <a:bodyPr/>
-          <a:p>
-            <a:pPr marL="0" lvl="0" indent="0" algn="r" rtl="0">
-              <a:spcBef>
-                <a:spcPts val="0"/>
-              </a:spcBef>
-              <a:spcAft>
-                <a:spcPts val="0"/>
-              </a:spcAft>
-              <a:buNone/>
-            </a:pPr>
-            <a:fld id="{00000000-1234-1234-1234-123412341234}" type="slidenum">
-              <a:rPr lang="en-GB"/>
-            </a:fld>
-            <a:endParaRPr lang="en-GB"/>
-          </a:p>
-        </p:txBody>
-      </p:sp>
-      <p:sp>
-        <p:nvSpPr>
-          <p:cNvPr id="6" name="Rectangles 5"/>
-          <p:cNvSpPr/>
-          <p:nvPr/>
-        </p:nvSpPr>
-        <p:spPr>
-          <a:xfrm>
-            <a:off x="544830" y="1972310"/>
-            <a:ext cx="8054340" cy="1106805"/>
-          </a:xfrm>
-          <a:prstGeom prst="rect">
-            <a:avLst/>
-          </a:prstGeom>
-          <a:noFill/>
-          <a:ln>
-            <a:noFill/>
-          </a:ln>
-          <a:extLst>
-            <a:ext uri="{909E8E84-426E-40DD-AFC4-6F175D3DCCD1}">
-              <a14:hiddenFill xmlns:a14="http://schemas.microsoft.com/office/drawing/2010/main">
-                <a:solidFill>
-                  <a:schemeClr val="bg2"/>
-                </a:solidFill>
-              </a14:hiddenFill>
-            </a:ext>
-          </a:extLst>
-        </p:spPr>
-        <p:txBody>
-          <a:bodyPr wrap="none" rtlCol="0" anchor="t">
-            <a:spAutoFit/>
-            <a:scene3d>
-              <a:camera prst="orthographicFront"/>
-              <a:lightRig rig="threePt" dir="t"/>
-            </a:scene3d>
-          </a:bodyPr>
-          <a:p>
-            <a:pPr algn="ctr"/>
-            <a:r>
-              <a:rPr lang="en-US" altLang="zh-CN" sz="6600" b="1">
-                <a:ln w="22225">
-                  <a:solidFill>
-                    <a:sysClr val="windowText" lastClr="000000"/>
-                  </a:solidFill>
-                  <a:prstDash val="solid"/>
-                </a:ln>
-                <a:solidFill>
-                  <a:schemeClr val="tx2">
-                    <a:lumMod val="90000"/>
-                  </a:schemeClr>
-                </a:solidFill>
-                <a:effectLst/>
-              </a:rPr>
-              <a:t>Result Presentation</a:t>
             </a:r>
             <a:endParaRPr lang="en-US" altLang="zh-CN" sz="6600" b="1">
               <a:ln w="22225">

</xml_diff>